<commit_message>
Atualizando versão do HLD
</commit_message>
<xml_diff>
--- a/Documentação/HLD&LLD/HLD v1.0.pptx
+++ b/Documentação/HLD&LLD/HLD v1.0.pptx
@@ -4,8 +4,11 @@
   <p:sldMasterIdLst>
     <p:sldMasterId id="2147483648" r:id="rId1"/>
   </p:sldMasterIdLst>
+  <p:notesMasterIdLst>
+    <p:notesMasterId r:id="rId3"/>
+  </p:notesMasterIdLst>
   <p:sldIdLst>
-    <p:sldId id="258" r:id="rId2"/>
+    <p:sldId id="259" r:id="rId2"/>
   </p:sldIdLst>
   <p:sldSz cx="12192000" cy="6858000"/>
   <p:notesSz cx="6858000" cy="9144000"/>
@@ -112,6 +115,1333 @@
 </p:presentation>
 </file>
 
+<file path=ppt/revisionInfo.xml><?xml version="1.0" encoding="utf-8"?>
+<p1510:revInfo xmlns:a="http://schemas.openxmlformats.org/drawingml/2006/main" xmlns:r="http://schemas.openxmlformats.org/officeDocument/2006/relationships" xmlns:p1510="http://schemas.microsoft.com/office/powerpoint/2015/10/main">
+  <p1510:revLst>
+    <p1510:client id="{C9C805C9-4D07-4BD9-AFF9-9C03319A5240}" v="191" dt="2020-09-30T20:40:29.408"/>
+  </p1510:revLst>
+</p1510:revInfo>
+</file>
+
+<file path=ppt/changesInfos/changesInfo1.xml><?xml version="1.0" encoding="utf-8"?>
+<pc:chgInfo xmlns:a="http://schemas.openxmlformats.org/drawingml/2006/main" xmlns:r="http://schemas.openxmlformats.org/officeDocument/2006/relationships" xmlns:ac="http://schemas.microsoft.com/office/drawing/2013/main/command" xmlns:pc="http://schemas.microsoft.com/office/powerpoint/2013/main/command">
+  <pc:docChgLst>
+    <pc:chgData name="cesar" userId="10cb0cc1dc347670" providerId="LiveId" clId="{C9C805C9-4D07-4BD9-AFF9-9C03319A5240}"/>
+    <pc:docChg chg="undo custSel addSld delSld modSld">
+      <pc:chgData name="cesar" userId="10cb0cc1dc347670" providerId="LiveId" clId="{C9C805C9-4D07-4BD9-AFF9-9C03319A5240}" dt="2020-09-30T20:46:39.950" v="1787" actId="478"/>
+      <pc:docMkLst>
+        <pc:docMk/>
+      </pc:docMkLst>
+      <pc:sldChg chg="addSp delSp modSp del mod">
+        <pc:chgData name="cesar" userId="10cb0cc1dc347670" providerId="LiveId" clId="{C9C805C9-4D07-4BD9-AFF9-9C03319A5240}" dt="2020-09-30T20:43:12.874" v="1778" actId="47"/>
+        <pc:sldMkLst>
+          <pc:docMk/>
+          <pc:sldMk cId="1015834183" sldId="258"/>
+        </pc:sldMkLst>
+        <pc:spChg chg="add del mod">
+          <ac:chgData name="cesar" userId="10cb0cc1dc347670" providerId="LiveId" clId="{C9C805C9-4D07-4BD9-AFF9-9C03319A5240}" dt="2020-09-30T19:41:55.544" v="61" actId="478"/>
+          <ac:spMkLst>
+            <pc:docMk/>
+            <pc:sldMk cId="1015834183" sldId="258"/>
+            <ac:spMk id="2" creationId="{CF86D03B-0FB7-4D5F-A44A-8A8D8B570BE2}"/>
+          </ac:spMkLst>
+        </pc:spChg>
+        <pc:spChg chg="add mod">
+          <ac:chgData name="cesar" userId="10cb0cc1dc347670" providerId="LiveId" clId="{C9C805C9-4D07-4BD9-AFF9-9C03319A5240}" dt="2020-09-30T19:43:35.310" v="103" actId="14100"/>
+          <ac:spMkLst>
+            <pc:docMk/>
+            <pc:sldMk cId="1015834183" sldId="258"/>
+            <ac:spMk id="10" creationId="{BFF79DE1-16D0-4440-840B-FEEADE02B969}"/>
+          </ac:spMkLst>
+        </pc:spChg>
+        <pc:spChg chg="add mod">
+          <ac:chgData name="cesar" userId="10cb0cc1dc347670" providerId="LiveId" clId="{C9C805C9-4D07-4BD9-AFF9-9C03319A5240}" dt="2020-09-30T20:03:59.727" v="562" actId="571"/>
+          <ac:spMkLst>
+            <pc:docMk/>
+            <pc:sldMk cId="1015834183" sldId="258"/>
+            <ac:spMk id="110" creationId="{5D6A58A9-9860-4C3E-8078-353A67EF937F}"/>
+          </ac:spMkLst>
+        </pc:spChg>
+        <pc:spChg chg="add mod">
+          <ac:chgData name="cesar" userId="10cb0cc1dc347670" providerId="LiveId" clId="{C9C805C9-4D07-4BD9-AFF9-9C03319A5240}" dt="2020-09-30T20:03:59.727" v="562" actId="571"/>
+          <ac:spMkLst>
+            <pc:docMk/>
+            <pc:sldMk cId="1015834183" sldId="258"/>
+            <ac:spMk id="111" creationId="{39F2105F-6ACA-4C3D-AC1F-A94EE7D6EA8B}"/>
+          </ac:spMkLst>
+        </pc:spChg>
+        <pc:spChg chg="add mod">
+          <ac:chgData name="cesar" userId="10cb0cc1dc347670" providerId="LiveId" clId="{C9C805C9-4D07-4BD9-AFF9-9C03319A5240}" dt="2020-09-30T20:03:59.727" v="562" actId="571"/>
+          <ac:spMkLst>
+            <pc:docMk/>
+            <pc:sldMk cId="1015834183" sldId="258"/>
+            <ac:spMk id="112" creationId="{79CAE5D6-F058-478D-B3DD-558CA1AAE6A3}"/>
+          </ac:spMkLst>
+        </pc:spChg>
+        <pc:spChg chg="add mod">
+          <ac:chgData name="cesar" userId="10cb0cc1dc347670" providerId="LiveId" clId="{C9C805C9-4D07-4BD9-AFF9-9C03319A5240}" dt="2020-09-30T20:03:59.727" v="562" actId="571"/>
+          <ac:spMkLst>
+            <pc:docMk/>
+            <pc:sldMk cId="1015834183" sldId="258"/>
+            <ac:spMk id="113" creationId="{4A6B0F99-47DE-4F06-A394-C532C15FC36B}"/>
+          </ac:spMkLst>
+        </pc:spChg>
+        <pc:spChg chg="add mod">
+          <ac:chgData name="cesar" userId="10cb0cc1dc347670" providerId="LiveId" clId="{C9C805C9-4D07-4BD9-AFF9-9C03319A5240}" dt="2020-09-30T20:03:59.727" v="562" actId="571"/>
+          <ac:spMkLst>
+            <pc:docMk/>
+            <pc:sldMk cId="1015834183" sldId="258"/>
+            <ac:spMk id="114" creationId="{67CE6910-8FAD-41BB-85B5-03D55D62C7C7}"/>
+          </ac:spMkLst>
+        </pc:spChg>
+        <pc:spChg chg="add mod">
+          <ac:chgData name="cesar" userId="10cb0cc1dc347670" providerId="LiveId" clId="{C9C805C9-4D07-4BD9-AFF9-9C03319A5240}" dt="2020-09-30T20:03:59.727" v="562" actId="571"/>
+          <ac:spMkLst>
+            <pc:docMk/>
+            <pc:sldMk cId="1015834183" sldId="258"/>
+            <ac:spMk id="116" creationId="{D0BA7331-1F70-4214-93CB-FC58C7AA0A78}"/>
+          </ac:spMkLst>
+        </pc:spChg>
+        <pc:spChg chg="add del mod">
+          <ac:chgData name="cesar" userId="10cb0cc1dc347670" providerId="LiveId" clId="{C9C805C9-4D07-4BD9-AFF9-9C03319A5240}" dt="2020-09-30T20:03:57.662" v="560" actId="21"/>
+          <ac:spMkLst>
+            <pc:docMk/>
+            <pc:sldMk cId="1015834183" sldId="258"/>
+            <ac:spMk id="1066" creationId="{429DE240-5EC0-4BDF-9D31-9851D3BFB70C}"/>
+          </ac:spMkLst>
+        </pc:spChg>
+        <pc:spChg chg="add del mod">
+          <ac:chgData name="cesar" userId="10cb0cc1dc347670" providerId="LiveId" clId="{C9C805C9-4D07-4BD9-AFF9-9C03319A5240}" dt="2020-09-30T20:03:57.662" v="560" actId="21"/>
+          <ac:spMkLst>
+            <pc:docMk/>
+            <pc:sldMk cId="1015834183" sldId="258"/>
+            <ac:spMk id="1067" creationId="{7DB5C331-0D98-426F-803D-FC1D2944EE34}"/>
+          </ac:spMkLst>
+        </pc:spChg>
+        <pc:spChg chg="add del mod">
+          <ac:chgData name="cesar" userId="10cb0cc1dc347670" providerId="LiveId" clId="{C9C805C9-4D07-4BD9-AFF9-9C03319A5240}" dt="2020-09-30T20:03:57.662" v="560" actId="21"/>
+          <ac:spMkLst>
+            <pc:docMk/>
+            <pc:sldMk cId="1015834183" sldId="258"/>
+            <ac:spMk id="1068" creationId="{552C0F2A-90A4-4169-BF53-618FF4CF037E}"/>
+          </ac:spMkLst>
+        </pc:spChg>
+        <pc:spChg chg="add del mod">
+          <ac:chgData name="cesar" userId="10cb0cc1dc347670" providerId="LiveId" clId="{C9C805C9-4D07-4BD9-AFF9-9C03319A5240}" dt="2020-09-30T20:03:57.662" v="560" actId="21"/>
+          <ac:spMkLst>
+            <pc:docMk/>
+            <pc:sldMk cId="1015834183" sldId="258"/>
+            <ac:spMk id="1069" creationId="{14E271A9-F283-4947-BC4F-AEF148A1ABC2}"/>
+          </ac:spMkLst>
+        </pc:spChg>
+        <pc:spChg chg="add del mod">
+          <ac:chgData name="cesar" userId="10cb0cc1dc347670" providerId="LiveId" clId="{C9C805C9-4D07-4BD9-AFF9-9C03319A5240}" dt="2020-09-30T20:03:57.662" v="560" actId="21"/>
+          <ac:spMkLst>
+            <pc:docMk/>
+            <pc:sldMk cId="1015834183" sldId="258"/>
+            <ac:spMk id="1070" creationId="{2FBD6112-27C1-4B7B-9AA7-CDE8EC0D49A6}"/>
+          </ac:spMkLst>
+        </pc:spChg>
+        <pc:spChg chg="add del mod">
+          <ac:chgData name="cesar" userId="10cb0cc1dc347670" providerId="LiveId" clId="{C9C805C9-4D07-4BD9-AFF9-9C03319A5240}" dt="2020-09-30T20:03:57.662" v="560" actId="21"/>
+          <ac:spMkLst>
+            <pc:docMk/>
+            <pc:sldMk cId="1015834183" sldId="258"/>
+            <ac:spMk id="1074" creationId="{4F56CED7-C417-48C7-92BA-910900937E5C}"/>
+          </ac:spMkLst>
+        </pc:spChg>
+        <pc:grpChg chg="add mod">
+          <ac:chgData name="cesar" userId="10cb0cc1dc347670" providerId="LiveId" clId="{C9C805C9-4D07-4BD9-AFF9-9C03319A5240}" dt="2020-09-30T20:03:59.727" v="562" actId="571"/>
+          <ac:grpSpMkLst>
+            <pc:docMk/>
+            <pc:sldMk cId="1015834183" sldId="258"/>
+            <ac:grpSpMk id="91" creationId="{1EAAD87A-CAC5-424F-A78B-9DEFBD21455E}"/>
+          </ac:grpSpMkLst>
+        </pc:grpChg>
+        <pc:grpChg chg="add mod">
+          <ac:chgData name="cesar" userId="10cb0cc1dc347670" providerId="LiveId" clId="{C9C805C9-4D07-4BD9-AFF9-9C03319A5240}" dt="2020-09-30T20:03:59.727" v="562" actId="571"/>
+          <ac:grpSpMkLst>
+            <pc:docMk/>
+            <pc:sldMk cId="1015834183" sldId="258"/>
+            <ac:grpSpMk id="94" creationId="{D2F1F677-C80D-4675-8A54-316FA17395CE}"/>
+          </ac:grpSpMkLst>
+        </pc:grpChg>
+        <pc:grpChg chg="add mod">
+          <ac:chgData name="cesar" userId="10cb0cc1dc347670" providerId="LiveId" clId="{C9C805C9-4D07-4BD9-AFF9-9C03319A5240}" dt="2020-09-30T20:03:59.727" v="562" actId="571"/>
+          <ac:grpSpMkLst>
+            <pc:docMk/>
+            <pc:sldMk cId="1015834183" sldId="258"/>
+            <ac:grpSpMk id="99" creationId="{7C74D198-5EB0-4A54-948F-20CAF0BC88E7}"/>
+          </ac:grpSpMkLst>
+        </pc:grpChg>
+        <pc:grpChg chg="add mod">
+          <ac:chgData name="cesar" userId="10cb0cc1dc347670" providerId="LiveId" clId="{C9C805C9-4D07-4BD9-AFF9-9C03319A5240}" dt="2020-09-30T20:03:59.727" v="562" actId="571"/>
+          <ac:grpSpMkLst>
+            <pc:docMk/>
+            <pc:sldMk cId="1015834183" sldId="258"/>
+            <ac:grpSpMk id="102" creationId="{20FB50DB-4ABF-408A-A923-7A7A786B4148}"/>
+          </ac:grpSpMkLst>
+        </pc:grpChg>
+        <pc:grpChg chg="add del mod">
+          <ac:chgData name="cesar" userId="10cb0cc1dc347670" providerId="LiveId" clId="{C9C805C9-4D07-4BD9-AFF9-9C03319A5240}" dt="2020-09-30T20:03:57.662" v="560" actId="21"/>
+          <ac:grpSpMkLst>
+            <pc:docMk/>
+            <pc:sldMk cId="1015834183" sldId="258"/>
+            <ac:grpSpMk id="1046" creationId="{A4249804-3756-42AB-B43A-158CE5C1247E}"/>
+          </ac:grpSpMkLst>
+        </pc:grpChg>
+        <pc:grpChg chg="add del mod">
+          <ac:chgData name="cesar" userId="10cb0cc1dc347670" providerId="LiveId" clId="{C9C805C9-4D07-4BD9-AFF9-9C03319A5240}" dt="2020-09-30T20:03:57.662" v="560" actId="21"/>
+          <ac:grpSpMkLst>
+            <pc:docMk/>
+            <pc:sldMk cId="1015834183" sldId="258"/>
+            <ac:grpSpMk id="1047" creationId="{7201FF5C-7925-49BC-BA2E-CA2BEBC30877}"/>
+          </ac:grpSpMkLst>
+        </pc:grpChg>
+        <pc:grpChg chg="add del mod">
+          <ac:chgData name="cesar" userId="10cb0cc1dc347670" providerId="LiveId" clId="{C9C805C9-4D07-4BD9-AFF9-9C03319A5240}" dt="2020-09-30T20:03:57.662" v="560" actId="21"/>
+          <ac:grpSpMkLst>
+            <pc:docMk/>
+            <pc:sldMk cId="1015834183" sldId="258"/>
+            <ac:grpSpMk id="1048" creationId="{95FDE16B-B0E5-4CB0-B719-00B3E9434844}"/>
+          </ac:grpSpMkLst>
+        </pc:grpChg>
+        <pc:grpChg chg="add del mod">
+          <ac:chgData name="cesar" userId="10cb0cc1dc347670" providerId="LiveId" clId="{C9C805C9-4D07-4BD9-AFF9-9C03319A5240}" dt="2020-09-30T20:03:57.662" v="560" actId="21"/>
+          <ac:grpSpMkLst>
+            <pc:docMk/>
+            <pc:sldMk cId="1015834183" sldId="258"/>
+            <ac:grpSpMk id="1049" creationId="{39D142FA-1C95-45B6-8551-76384EF7E83E}"/>
+          </ac:grpSpMkLst>
+        </pc:grpChg>
+        <pc:grpChg chg="add del mod">
+          <ac:chgData name="cesar" userId="10cb0cc1dc347670" providerId="LiveId" clId="{C9C805C9-4D07-4BD9-AFF9-9C03319A5240}" dt="2020-09-30T19:58:12.141" v="501" actId="478"/>
+          <ac:grpSpMkLst>
+            <pc:docMk/>
+            <pc:sldMk cId="1015834183" sldId="258"/>
+            <ac:grpSpMk id="1055" creationId="{71689FD9-32F4-4E7D-BFBC-7C12B3140A67}"/>
+          </ac:grpSpMkLst>
+        </pc:grpChg>
+        <pc:picChg chg="mod">
+          <ac:chgData name="cesar" userId="10cb0cc1dc347670" providerId="LiveId" clId="{C9C805C9-4D07-4BD9-AFF9-9C03319A5240}" dt="2020-09-30T19:50:35.572" v="289" actId="1076"/>
+          <ac:picMkLst>
+            <pc:docMk/>
+            <pc:sldMk cId="1015834183" sldId="258"/>
+            <ac:picMk id="7" creationId="{92726F2E-CBE8-477A-8CBE-A2E01E40B18C}"/>
+          </ac:picMkLst>
+        </pc:picChg>
+        <pc:picChg chg="del mod">
+          <ac:chgData name="cesar" userId="10cb0cc1dc347670" providerId="LiveId" clId="{C9C805C9-4D07-4BD9-AFF9-9C03319A5240}" dt="2020-09-30T19:41:58.685" v="62" actId="478"/>
+          <ac:picMkLst>
+            <pc:docMk/>
+            <pc:sldMk cId="1015834183" sldId="258"/>
+            <ac:picMk id="12" creationId="{74A5AF6B-91CE-4F99-9322-DF7359404A42}"/>
+          </ac:picMkLst>
+        </pc:picChg>
+        <pc:picChg chg="add del mod">
+          <ac:chgData name="cesar" userId="10cb0cc1dc347670" providerId="LiveId" clId="{C9C805C9-4D07-4BD9-AFF9-9C03319A5240}" dt="2020-09-30T19:45:55.538" v="136" actId="478"/>
+          <ac:picMkLst>
+            <pc:docMk/>
+            <pc:sldMk cId="1015834183" sldId="258"/>
+            <ac:picMk id="13" creationId="{133E72A6-8D9D-4A6A-8903-7539518E13E8}"/>
+          </ac:picMkLst>
+        </pc:picChg>
+        <pc:picChg chg="add mod">
+          <ac:chgData name="cesar" userId="10cb0cc1dc347670" providerId="LiveId" clId="{C9C805C9-4D07-4BD9-AFF9-9C03319A5240}" dt="2020-09-30T19:49:20.064" v="260" actId="164"/>
+          <ac:picMkLst>
+            <pc:docMk/>
+            <pc:sldMk cId="1015834183" sldId="258"/>
+            <ac:picMk id="15" creationId="{97F62119-A780-401A-947F-6EC3CC5F663F}"/>
+          </ac:picMkLst>
+        </pc:picChg>
+        <pc:picChg chg="del mod">
+          <ac:chgData name="cesar" userId="10cb0cc1dc347670" providerId="LiveId" clId="{C9C805C9-4D07-4BD9-AFF9-9C03319A5240}" dt="2020-09-30T19:49:35.900" v="267" actId="478"/>
+          <ac:picMkLst>
+            <pc:docMk/>
+            <pc:sldMk cId="1015834183" sldId="258"/>
+            <ac:picMk id="20" creationId="{16D9C6DA-9344-48C9-BC3C-FFC00887F213}"/>
+          </ac:picMkLst>
+        </pc:picChg>
+        <pc:picChg chg="add del mod">
+          <ac:chgData name="cesar" userId="10cb0cc1dc347670" providerId="LiveId" clId="{C9C805C9-4D07-4BD9-AFF9-9C03319A5240}" dt="2020-09-30T20:03:57.662" v="560" actId="21"/>
+          <ac:picMkLst>
+            <pc:docMk/>
+            <pc:sldMk cId="1015834183" sldId="258"/>
+            <ac:picMk id="23" creationId="{C0EB4E6C-8DCB-4626-91F9-2C4B9601A635}"/>
+          </ac:picMkLst>
+        </pc:picChg>
+        <pc:picChg chg="del mod">
+          <ac:chgData name="cesar" userId="10cb0cc1dc347670" providerId="LiveId" clId="{C9C805C9-4D07-4BD9-AFF9-9C03319A5240}" dt="2020-09-30T19:49:36.880" v="268" actId="478"/>
+          <ac:picMkLst>
+            <pc:docMk/>
+            <pc:sldMk cId="1015834183" sldId="258"/>
+            <ac:picMk id="24" creationId="{EEC072D1-8F7B-4923-A1C0-D7721A4B00B1}"/>
+          </ac:picMkLst>
+        </pc:picChg>
+        <pc:picChg chg="add mod">
+          <ac:chgData name="cesar" userId="10cb0cc1dc347670" providerId="LiveId" clId="{C9C805C9-4D07-4BD9-AFF9-9C03319A5240}" dt="2020-09-30T20:03:59.727" v="562" actId="571"/>
+          <ac:picMkLst>
+            <pc:docMk/>
+            <pc:sldMk cId="1015834183" sldId="258"/>
+            <ac:picMk id="90" creationId="{89CBC51D-F4E8-4178-99AF-6838B5BFA32C}"/>
+          </ac:picMkLst>
+        </pc:picChg>
+        <pc:picChg chg="mod">
+          <ac:chgData name="cesar" userId="10cb0cc1dc347670" providerId="LiveId" clId="{C9C805C9-4D07-4BD9-AFF9-9C03319A5240}" dt="2020-09-30T20:03:59.727" v="562" actId="571"/>
+          <ac:picMkLst>
+            <pc:docMk/>
+            <pc:sldMk cId="1015834183" sldId="258"/>
+            <ac:picMk id="92" creationId="{47F1CF35-2F2C-45DE-B87D-0C86E5743793}"/>
+          </ac:picMkLst>
+        </pc:picChg>
+        <pc:picChg chg="mod">
+          <ac:chgData name="cesar" userId="10cb0cc1dc347670" providerId="LiveId" clId="{C9C805C9-4D07-4BD9-AFF9-9C03319A5240}" dt="2020-09-30T20:03:59.727" v="562" actId="571"/>
+          <ac:picMkLst>
+            <pc:docMk/>
+            <pc:sldMk cId="1015834183" sldId="258"/>
+            <ac:picMk id="93" creationId="{BB94FAD3-CC83-4A76-81D8-21DE8B869827}"/>
+          </ac:picMkLst>
+        </pc:picChg>
+        <pc:picChg chg="mod">
+          <ac:chgData name="cesar" userId="10cb0cc1dc347670" providerId="LiveId" clId="{C9C805C9-4D07-4BD9-AFF9-9C03319A5240}" dt="2020-09-30T20:03:59.727" v="562" actId="571"/>
+          <ac:picMkLst>
+            <pc:docMk/>
+            <pc:sldMk cId="1015834183" sldId="258"/>
+            <ac:picMk id="95" creationId="{90CB1A29-6096-4850-B9FB-D213465C8D8F}"/>
+          </ac:picMkLst>
+        </pc:picChg>
+        <pc:picChg chg="mod">
+          <ac:chgData name="cesar" userId="10cb0cc1dc347670" providerId="LiveId" clId="{C9C805C9-4D07-4BD9-AFF9-9C03319A5240}" dt="2020-09-30T20:03:59.727" v="562" actId="571"/>
+          <ac:picMkLst>
+            <pc:docMk/>
+            <pc:sldMk cId="1015834183" sldId="258"/>
+            <ac:picMk id="96" creationId="{6C0ACB24-79C6-4288-9E96-61B104C83232}"/>
+          </ac:picMkLst>
+        </pc:picChg>
+        <pc:picChg chg="mod">
+          <ac:chgData name="cesar" userId="10cb0cc1dc347670" providerId="LiveId" clId="{C9C805C9-4D07-4BD9-AFF9-9C03319A5240}" dt="2020-09-30T20:03:59.727" v="562" actId="571"/>
+          <ac:picMkLst>
+            <pc:docMk/>
+            <pc:sldMk cId="1015834183" sldId="258"/>
+            <ac:picMk id="97" creationId="{4717F65C-C52E-4C6B-A2DC-A35D9E38A941}"/>
+          </ac:picMkLst>
+        </pc:picChg>
+        <pc:picChg chg="add mod">
+          <ac:chgData name="cesar" userId="10cb0cc1dc347670" providerId="LiveId" clId="{C9C805C9-4D07-4BD9-AFF9-9C03319A5240}" dt="2020-09-30T20:03:59.727" v="562" actId="571"/>
+          <ac:picMkLst>
+            <pc:docMk/>
+            <pc:sldMk cId="1015834183" sldId="258"/>
+            <ac:picMk id="98" creationId="{6B2C90D2-95D7-453D-8D08-49121C971939}"/>
+          </ac:picMkLst>
+        </pc:picChg>
+        <pc:picChg chg="mod">
+          <ac:chgData name="cesar" userId="10cb0cc1dc347670" providerId="LiveId" clId="{C9C805C9-4D07-4BD9-AFF9-9C03319A5240}" dt="2020-09-30T20:03:59.727" v="562" actId="571"/>
+          <ac:picMkLst>
+            <pc:docMk/>
+            <pc:sldMk cId="1015834183" sldId="258"/>
+            <ac:picMk id="100" creationId="{13E65561-7BC8-49B1-B6F0-6FED1FCDCECA}"/>
+          </ac:picMkLst>
+        </pc:picChg>
+        <pc:picChg chg="mod">
+          <ac:chgData name="cesar" userId="10cb0cc1dc347670" providerId="LiveId" clId="{C9C805C9-4D07-4BD9-AFF9-9C03319A5240}" dt="2020-09-30T20:03:59.727" v="562" actId="571"/>
+          <ac:picMkLst>
+            <pc:docMk/>
+            <pc:sldMk cId="1015834183" sldId="258"/>
+            <ac:picMk id="101" creationId="{9FEB4C5E-7A87-4B41-853F-0D26620211BF}"/>
+          </ac:picMkLst>
+        </pc:picChg>
+        <pc:picChg chg="mod">
+          <ac:chgData name="cesar" userId="10cb0cc1dc347670" providerId="LiveId" clId="{C9C805C9-4D07-4BD9-AFF9-9C03319A5240}" dt="2020-09-30T20:03:59.727" v="562" actId="571"/>
+          <ac:picMkLst>
+            <pc:docMk/>
+            <pc:sldMk cId="1015834183" sldId="258"/>
+            <ac:picMk id="103" creationId="{CD97F6A2-FD4A-4D9E-A065-7B86A3345866}"/>
+          </ac:picMkLst>
+        </pc:picChg>
+        <pc:picChg chg="mod">
+          <ac:chgData name="cesar" userId="10cb0cc1dc347670" providerId="LiveId" clId="{C9C805C9-4D07-4BD9-AFF9-9C03319A5240}" dt="2020-09-30T20:03:59.727" v="562" actId="571"/>
+          <ac:picMkLst>
+            <pc:docMk/>
+            <pc:sldMk cId="1015834183" sldId="258"/>
+            <ac:picMk id="104" creationId="{6F884F5A-F476-431D-94E8-CAB6B01EE1DD}"/>
+          </ac:picMkLst>
+        </pc:picChg>
+        <pc:picChg chg="mod">
+          <ac:chgData name="cesar" userId="10cb0cc1dc347670" providerId="LiveId" clId="{C9C805C9-4D07-4BD9-AFF9-9C03319A5240}" dt="2020-09-30T20:03:59.727" v="562" actId="571"/>
+          <ac:picMkLst>
+            <pc:docMk/>
+            <pc:sldMk cId="1015834183" sldId="258"/>
+            <ac:picMk id="105" creationId="{54D1A487-420A-45FF-A37A-EB3FE3930095}"/>
+          </ac:picMkLst>
+        </pc:picChg>
+        <pc:picChg chg="add mod">
+          <ac:chgData name="cesar" userId="10cb0cc1dc347670" providerId="LiveId" clId="{C9C805C9-4D07-4BD9-AFF9-9C03319A5240}" dt="2020-09-30T20:03:59.727" v="562" actId="571"/>
+          <ac:picMkLst>
+            <pc:docMk/>
+            <pc:sldMk cId="1015834183" sldId="258"/>
+            <ac:picMk id="106" creationId="{B2BCD0EA-BF51-48E9-9D67-89088A82CE23}"/>
+          </ac:picMkLst>
+        </pc:picChg>
+        <pc:picChg chg="add mod">
+          <ac:chgData name="cesar" userId="10cb0cc1dc347670" providerId="LiveId" clId="{C9C805C9-4D07-4BD9-AFF9-9C03319A5240}" dt="2020-09-30T20:03:59.727" v="562" actId="571"/>
+          <ac:picMkLst>
+            <pc:docMk/>
+            <pc:sldMk cId="1015834183" sldId="258"/>
+            <ac:picMk id="107" creationId="{184E7EA2-8BE6-4699-80F9-85C3E0D91D5B}"/>
+          </ac:picMkLst>
+        </pc:picChg>
+        <pc:picChg chg="add mod">
+          <ac:chgData name="cesar" userId="10cb0cc1dc347670" providerId="LiveId" clId="{C9C805C9-4D07-4BD9-AFF9-9C03319A5240}" dt="2020-09-30T20:03:59.727" v="562" actId="571"/>
+          <ac:picMkLst>
+            <pc:docMk/>
+            <pc:sldMk cId="1015834183" sldId="258"/>
+            <ac:picMk id="108" creationId="{C7B5260A-0F9E-48CA-864F-81A09038BC7E}"/>
+          </ac:picMkLst>
+        </pc:picChg>
+        <pc:picChg chg="add mod">
+          <ac:chgData name="cesar" userId="10cb0cc1dc347670" providerId="LiveId" clId="{C9C805C9-4D07-4BD9-AFF9-9C03319A5240}" dt="2020-09-30T20:03:59.727" v="562" actId="571"/>
+          <ac:picMkLst>
+            <pc:docMk/>
+            <pc:sldMk cId="1015834183" sldId="258"/>
+            <ac:picMk id="109" creationId="{918EA980-724F-4FAD-B9A9-B42C2F6A1BB1}"/>
+          </ac:picMkLst>
+        </pc:picChg>
+        <pc:picChg chg="add mod">
+          <ac:chgData name="cesar" userId="10cb0cc1dc347670" providerId="LiveId" clId="{C9C805C9-4D07-4BD9-AFF9-9C03319A5240}" dt="2020-09-30T20:03:59.727" v="562" actId="571"/>
+          <ac:picMkLst>
+            <pc:docMk/>
+            <pc:sldMk cId="1015834183" sldId="258"/>
+            <ac:picMk id="115" creationId="{13889BCF-2125-4CE9-8228-42F11E30D669}"/>
+          </ac:picMkLst>
+        </pc:picChg>
+        <pc:picChg chg="add mod">
+          <ac:chgData name="cesar" userId="10cb0cc1dc347670" providerId="LiveId" clId="{C9C805C9-4D07-4BD9-AFF9-9C03319A5240}" dt="2020-09-30T20:03:59.727" v="562" actId="571"/>
+          <ac:picMkLst>
+            <pc:docMk/>
+            <pc:sldMk cId="1015834183" sldId="258"/>
+            <ac:picMk id="117" creationId="{2BAC88FB-A43D-40E4-A400-C03D929A56C8}"/>
+          </ac:picMkLst>
+        </pc:picChg>
+        <pc:picChg chg="mod">
+          <ac:chgData name="cesar" userId="10cb0cc1dc347670" providerId="LiveId" clId="{C9C805C9-4D07-4BD9-AFF9-9C03319A5240}" dt="2020-09-30T19:54:33.292" v="390" actId="1076"/>
+          <ac:picMkLst>
+            <pc:docMk/>
+            <pc:sldMk cId="1015834183" sldId="258"/>
+            <ac:picMk id="1028" creationId="{A99E5A0F-2A0E-43EE-852E-F5E5511A6067}"/>
+          </ac:picMkLst>
+        </pc:picChg>
+        <pc:picChg chg="del mod">
+          <ac:chgData name="cesar" userId="10cb0cc1dc347670" providerId="LiveId" clId="{C9C805C9-4D07-4BD9-AFF9-9C03319A5240}" dt="2020-09-30T19:49:47.195" v="273" actId="478"/>
+          <ac:picMkLst>
+            <pc:docMk/>
+            <pc:sldMk cId="1015834183" sldId="258"/>
+            <ac:picMk id="1029" creationId="{ABBD97BA-B3B3-4A56-8696-3F9FE06394C7}"/>
+          </ac:picMkLst>
+        </pc:picChg>
+        <pc:picChg chg="add del mod">
+          <ac:chgData name="cesar" userId="10cb0cc1dc347670" providerId="LiveId" clId="{C9C805C9-4D07-4BD9-AFF9-9C03319A5240}" dt="2020-09-30T20:03:57.662" v="560" actId="21"/>
+          <ac:picMkLst>
+            <pc:docMk/>
+            <pc:sldMk cId="1015834183" sldId="258"/>
+            <ac:picMk id="1038" creationId="{0C30F01B-CD60-4F47-AAD8-241790227307}"/>
+          </ac:picMkLst>
+        </pc:picChg>
+        <pc:picChg chg="del mod">
+          <ac:chgData name="cesar" userId="10cb0cc1dc347670" providerId="LiveId" clId="{C9C805C9-4D07-4BD9-AFF9-9C03319A5240}" dt="2020-09-30T19:49:50.040" v="276" actId="478"/>
+          <ac:picMkLst>
+            <pc:docMk/>
+            <pc:sldMk cId="1015834183" sldId="258"/>
+            <ac:picMk id="1039" creationId="{42719BBA-B76E-404D-A05F-8CEC1379EDBD}"/>
+          </ac:picMkLst>
+        </pc:picChg>
+        <pc:picChg chg="del mod">
+          <ac:chgData name="cesar" userId="10cb0cc1dc347670" providerId="LiveId" clId="{C9C805C9-4D07-4BD9-AFF9-9C03319A5240}" dt="2020-09-30T19:49:49.338" v="274" actId="478"/>
+          <ac:picMkLst>
+            <pc:docMk/>
+            <pc:sldMk cId="1015834183" sldId="258"/>
+            <ac:picMk id="1040" creationId="{F04F234A-F355-4E39-96CC-8D1A5C03275E}"/>
+          </ac:picMkLst>
+        </pc:picChg>
+        <pc:picChg chg="mod">
+          <ac:chgData name="cesar" userId="10cb0cc1dc347670" providerId="LiveId" clId="{C9C805C9-4D07-4BD9-AFF9-9C03319A5240}" dt="2020-09-30T19:51:28.718" v="315" actId="1076"/>
+          <ac:picMkLst>
+            <pc:docMk/>
+            <pc:sldMk cId="1015834183" sldId="258"/>
+            <ac:picMk id="1043" creationId="{2D495B21-1587-47C2-9587-AD5565F6B90C}"/>
+          </ac:picMkLst>
+        </pc:picChg>
+        <pc:picChg chg="mod">
+          <ac:chgData name="cesar" userId="10cb0cc1dc347670" providerId="LiveId" clId="{C9C805C9-4D07-4BD9-AFF9-9C03319A5240}" dt="2020-09-30T19:51:28.718" v="315" actId="1076"/>
+          <ac:picMkLst>
+            <pc:docMk/>
+            <pc:sldMk cId="1015834183" sldId="258"/>
+            <ac:picMk id="1045" creationId="{53B8F879-63FC-4C54-AA77-14EABE2954C0}"/>
+          </ac:picMkLst>
+        </pc:picChg>
+        <pc:picChg chg="add del mod">
+          <ac:chgData name="cesar" userId="10cb0cc1dc347670" providerId="LiveId" clId="{C9C805C9-4D07-4BD9-AFF9-9C03319A5240}" dt="2020-09-30T20:03:57.662" v="560" actId="21"/>
+          <ac:picMkLst>
+            <pc:docMk/>
+            <pc:sldMk cId="1015834183" sldId="258"/>
+            <ac:picMk id="1057" creationId="{E7A57177-8ADC-4445-8A0F-AE03BD9E9D1C}"/>
+          </ac:picMkLst>
+        </pc:picChg>
+        <pc:picChg chg="add del mod">
+          <ac:chgData name="cesar" userId="10cb0cc1dc347670" providerId="LiveId" clId="{C9C805C9-4D07-4BD9-AFF9-9C03319A5240}" dt="2020-09-30T20:04:11.332" v="571" actId="1076"/>
+          <ac:picMkLst>
+            <pc:docMk/>
+            <pc:sldMk cId="1015834183" sldId="258"/>
+            <ac:picMk id="1058" creationId="{5166FDF0-E1C1-41B2-B6C5-73FC4CD3D3F3}"/>
+          </ac:picMkLst>
+        </pc:picChg>
+        <pc:picChg chg="add del mod">
+          <ac:chgData name="cesar" userId="10cb0cc1dc347670" providerId="LiveId" clId="{C9C805C9-4D07-4BD9-AFF9-9C03319A5240}" dt="2020-09-30T20:03:57.662" v="560" actId="21"/>
+          <ac:picMkLst>
+            <pc:docMk/>
+            <pc:sldMk cId="1015834183" sldId="258"/>
+            <ac:picMk id="1059" creationId="{E784D167-F281-4C0F-81C5-127730E90899}"/>
+          </ac:picMkLst>
+        </pc:picChg>
+        <pc:picChg chg="add del mod">
+          <ac:chgData name="cesar" userId="10cb0cc1dc347670" providerId="LiveId" clId="{C9C805C9-4D07-4BD9-AFF9-9C03319A5240}" dt="2020-09-30T20:03:57.662" v="560" actId="21"/>
+          <ac:picMkLst>
+            <pc:docMk/>
+            <pc:sldMk cId="1015834183" sldId="258"/>
+            <ac:picMk id="1060" creationId="{7E4F0076-7D7D-4D19-B020-0936952B7842}"/>
+          </ac:picMkLst>
+        </pc:picChg>
+        <pc:picChg chg="add del mod">
+          <ac:chgData name="cesar" userId="10cb0cc1dc347670" providerId="LiveId" clId="{C9C805C9-4D07-4BD9-AFF9-9C03319A5240}" dt="2020-09-30T20:03:57.662" v="560" actId="21"/>
+          <ac:picMkLst>
+            <pc:docMk/>
+            <pc:sldMk cId="1015834183" sldId="258"/>
+            <ac:picMk id="1061" creationId="{5D9257E6-2E2B-4F45-86F6-DB65EA238FE0}"/>
+          </ac:picMkLst>
+        </pc:picChg>
+        <pc:picChg chg="add del mod">
+          <ac:chgData name="cesar" userId="10cb0cc1dc347670" providerId="LiveId" clId="{C9C805C9-4D07-4BD9-AFF9-9C03319A5240}" dt="2020-09-30T19:57:55.666" v="493" actId="22"/>
+          <ac:picMkLst>
+            <pc:docMk/>
+            <pc:sldMk cId="1015834183" sldId="258"/>
+            <ac:picMk id="1071" creationId="{EB74237D-0623-4EBF-956F-99AD58E2AD07}"/>
+          </ac:picMkLst>
+        </pc:picChg>
+        <pc:picChg chg="add del mod">
+          <ac:chgData name="cesar" userId="10cb0cc1dc347670" providerId="LiveId" clId="{C9C805C9-4D07-4BD9-AFF9-9C03319A5240}" dt="2020-09-30T20:03:57.662" v="560" actId="21"/>
+          <ac:picMkLst>
+            <pc:docMk/>
+            <pc:sldMk cId="1015834183" sldId="258"/>
+            <ac:picMk id="1073" creationId="{353FB280-1D8A-46C9-87F3-C1D2303AF04D}"/>
+          </ac:picMkLst>
+        </pc:picChg>
+        <pc:picChg chg="add del mod">
+          <ac:chgData name="cesar" userId="10cb0cc1dc347670" providerId="LiveId" clId="{C9C805C9-4D07-4BD9-AFF9-9C03319A5240}" dt="2020-09-30T20:04:12.161" v="572"/>
+          <ac:picMkLst>
+            <pc:docMk/>
+            <pc:sldMk cId="1015834183" sldId="258"/>
+            <ac:picMk id="1075" creationId="{3B99A0B7-46D7-475A-AA95-34CE658D3AE9}"/>
+          </ac:picMkLst>
+        </pc:picChg>
+        <pc:cxnChg chg="add del mod">
+          <ac:chgData name="cesar" userId="10cb0cc1dc347670" providerId="LiveId" clId="{C9C805C9-4D07-4BD9-AFF9-9C03319A5240}" dt="2020-09-30T19:43:56.601" v="109" actId="478"/>
+          <ac:cxnSpMkLst>
+            <pc:docMk/>
+            <pc:sldMk cId="1015834183" sldId="258"/>
+            <ac:cxnSpMk id="5" creationId="{6621B878-8F63-4B37-AC82-247844CFE535}"/>
+          </ac:cxnSpMkLst>
+        </pc:cxnChg>
+        <pc:cxnChg chg="add del mod">
+          <ac:chgData name="cesar" userId="10cb0cc1dc347670" providerId="LiveId" clId="{C9C805C9-4D07-4BD9-AFF9-9C03319A5240}" dt="2020-09-30T19:47:42.756" v="233" actId="478"/>
+          <ac:cxnSpMkLst>
+            <pc:docMk/>
+            <pc:sldMk cId="1015834183" sldId="258"/>
+            <ac:cxnSpMk id="17" creationId="{E98915FC-D956-449F-9FEB-97F21F83E488}"/>
+          </ac:cxnSpMkLst>
+        </pc:cxnChg>
+        <pc:cxnChg chg="add mod">
+          <ac:chgData name="cesar" userId="10cb0cc1dc347670" providerId="LiveId" clId="{C9C805C9-4D07-4BD9-AFF9-9C03319A5240}" dt="2020-09-30T19:58:07.789" v="498" actId="14100"/>
+          <ac:cxnSpMkLst>
+            <pc:docMk/>
+            <pc:sldMk cId="1015834183" sldId="258"/>
+            <ac:cxnSpMk id="29" creationId="{D1102220-45B4-467F-B657-69680B8EF37D}"/>
+          </ac:cxnSpMkLst>
+        </pc:cxnChg>
+        <pc:cxnChg chg="add del mod">
+          <ac:chgData name="cesar" userId="10cb0cc1dc347670" providerId="LiveId" clId="{C9C805C9-4D07-4BD9-AFF9-9C03319A5240}" dt="2020-09-30T19:51:51.041" v="320" actId="478"/>
+          <ac:cxnSpMkLst>
+            <pc:docMk/>
+            <pc:sldMk cId="1015834183" sldId="258"/>
+            <ac:cxnSpMk id="1063" creationId="{B6AB928E-24C4-4248-ABDD-EC58E8A69273}"/>
+          </ac:cxnSpMkLst>
+        </pc:cxnChg>
+      </pc:sldChg>
+      <pc:sldChg chg="addSp delSp add del">
+        <pc:chgData name="cesar" userId="10cb0cc1dc347670" providerId="LiveId" clId="{C9C805C9-4D07-4BD9-AFF9-9C03319A5240}" dt="2020-09-30T20:04:09.717" v="567" actId="2890"/>
+        <pc:sldMkLst>
+          <pc:docMk/>
+          <pc:sldMk cId="2126013080" sldId="259"/>
+        </pc:sldMkLst>
+        <pc:picChg chg="add del">
+          <ac:chgData name="cesar" userId="10cb0cc1dc347670" providerId="LiveId" clId="{C9C805C9-4D07-4BD9-AFF9-9C03319A5240}" dt="2020-09-30T20:04:09.072" v="566" actId="478"/>
+          <ac:picMkLst>
+            <pc:docMk/>
+            <pc:sldMk cId="2126013080" sldId="259"/>
+            <ac:picMk id="1075" creationId="{3B99A0B7-46D7-475A-AA95-34CE658D3AE9}"/>
+          </ac:picMkLst>
+        </pc:picChg>
+      </pc:sldChg>
+      <pc:sldChg chg="addSp delSp modSp add mod">
+        <pc:chgData name="cesar" userId="10cb0cc1dc347670" providerId="LiveId" clId="{C9C805C9-4D07-4BD9-AFF9-9C03319A5240}" dt="2020-09-30T20:46:39.950" v="1787" actId="478"/>
+        <pc:sldMkLst>
+          <pc:docMk/>
+          <pc:sldMk cId="2960734336" sldId="259"/>
+        </pc:sldMkLst>
+        <pc:spChg chg="add del mod">
+          <ac:chgData name="cesar" userId="10cb0cc1dc347670" providerId="LiveId" clId="{C9C805C9-4D07-4BD9-AFF9-9C03319A5240}" dt="2020-09-30T20:46:12.144" v="1779" actId="478"/>
+          <ac:spMkLst>
+            <pc:docMk/>
+            <pc:sldMk cId="2960734336" sldId="259"/>
+            <ac:spMk id="9" creationId="{E04DFBC8-5948-41E1-BBA4-8B31968ADEAD}"/>
+          </ac:spMkLst>
+        </pc:spChg>
+        <pc:spChg chg="mod">
+          <ac:chgData name="cesar" userId="10cb0cc1dc347670" providerId="LiveId" clId="{C9C805C9-4D07-4BD9-AFF9-9C03319A5240}" dt="2020-09-30T20:21:14.336" v="974" actId="1076"/>
+          <ac:spMkLst>
+            <pc:docMk/>
+            <pc:sldMk cId="2960734336" sldId="259"/>
+            <ac:spMk id="10" creationId="{BFF79DE1-16D0-4440-840B-FEEADE02B969}"/>
+          </ac:spMkLst>
+        </pc:spChg>
+        <pc:spChg chg="add del mod">
+          <ac:chgData name="cesar" userId="10cb0cc1dc347670" providerId="LiveId" clId="{C9C805C9-4D07-4BD9-AFF9-9C03319A5240}" dt="2020-09-30T20:46:12.144" v="1779" actId="478"/>
+          <ac:spMkLst>
+            <pc:docMk/>
+            <pc:sldMk cId="2960734336" sldId="259"/>
+            <ac:spMk id="11" creationId="{B6BD06BE-89D1-4013-941D-804DE63A7CE9}"/>
+          </ac:spMkLst>
+        </pc:spChg>
+        <pc:spChg chg="add del mod">
+          <ac:chgData name="cesar" userId="10cb0cc1dc347670" providerId="LiveId" clId="{C9C805C9-4D07-4BD9-AFF9-9C03319A5240}" dt="2020-09-30T20:46:12.144" v="1779" actId="478"/>
+          <ac:spMkLst>
+            <pc:docMk/>
+            <pc:sldMk cId="2960734336" sldId="259"/>
+            <ac:spMk id="12" creationId="{2D38FBAE-7272-4050-B1E3-63054C9AEB22}"/>
+          </ac:spMkLst>
+        </pc:spChg>
+        <pc:spChg chg="add mod">
+          <ac:chgData name="cesar" userId="10cb0cc1dc347670" providerId="LiveId" clId="{C9C805C9-4D07-4BD9-AFF9-9C03319A5240}" dt="2020-09-30T20:34:51.280" v="1438" actId="164"/>
+          <ac:spMkLst>
+            <pc:docMk/>
+            <pc:sldMk cId="2960734336" sldId="259"/>
+            <ac:spMk id="13" creationId="{16B0E54F-0B62-4E87-8B45-361AFE1331FA}"/>
+          </ac:spMkLst>
+        </pc:spChg>
+        <pc:spChg chg="add mod">
+          <ac:chgData name="cesar" userId="10cb0cc1dc347670" providerId="LiveId" clId="{C9C805C9-4D07-4BD9-AFF9-9C03319A5240}" dt="2020-09-30T20:34:51.280" v="1438" actId="164"/>
+          <ac:spMkLst>
+            <pc:docMk/>
+            <pc:sldMk cId="2960734336" sldId="259"/>
+            <ac:spMk id="14" creationId="{34B57A0A-370A-4F14-BBE1-5C87EB424A3E}"/>
+          </ac:spMkLst>
+        </pc:spChg>
+        <pc:spChg chg="add mod">
+          <ac:chgData name="cesar" userId="10cb0cc1dc347670" providerId="LiveId" clId="{C9C805C9-4D07-4BD9-AFF9-9C03319A5240}" dt="2020-09-30T20:46:14.980" v="1780" actId="6549"/>
+          <ac:spMkLst>
+            <pc:docMk/>
+            <pc:sldMk cId="2960734336" sldId="259"/>
+            <ac:spMk id="15" creationId="{75174479-1EBA-49CB-9A84-5DF2B7516826}"/>
+          </ac:spMkLst>
+        </pc:spChg>
+        <pc:spChg chg="add mod">
+          <ac:chgData name="cesar" userId="10cb0cc1dc347670" providerId="LiveId" clId="{C9C805C9-4D07-4BD9-AFF9-9C03319A5240}" dt="2020-09-30T20:34:25.952" v="1431" actId="1076"/>
+          <ac:spMkLst>
+            <pc:docMk/>
+            <pc:sldMk cId="2960734336" sldId="259"/>
+            <ac:spMk id="16" creationId="{8DD76760-ADA3-485A-AC61-028D47F2E0A1}"/>
+          </ac:spMkLst>
+        </pc:spChg>
+        <pc:spChg chg="mod">
+          <ac:chgData name="cesar" userId="10cb0cc1dc347670" providerId="LiveId" clId="{C9C805C9-4D07-4BD9-AFF9-9C03319A5240}" dt="2020-09-30T20:31:33.061" v="1208"/>
+          <ac:spMkLst>
+            <pc:docMk/>
+            <pc:sldMk cId="2960734336" sldId="259"/>
+            <ac:spMk id="56" creationId="{40454376-A392-4A45-9B86-6892B4CEB2C4}"/>
+          </ac:spMkLst>
+        </pc:spChg>
+        <pc:spChg chg="mod">
+          <ac:chgData name="cesar" userId="10cb0cc1dc347670" providerId="LiveId" clId="{C9C805C9-4D07-4BD9-AFF9-9C03319A5240}" dt="2020-09-30T20:31:33.061" v="1208"/>
+          <ac:spMkLst>
+            <pc:docMk/>
+            <pc:sldMk cId="2960734336" sldId="259"/>
+            <ac:spMk id="57" creationId="{7404BECF-3B2F-4301-89CC-63C521FF2DDE}"/>
+          </ac:spMkLst>
+        </pc:spChg>
+        <pc:spChg chg="mod">
+          <ac:chgData name="cesar" userId="10cb0cc1dc347670" providerId="LiveId" clId="{C9C805C9-4D07-4BD9-AFF9-9C03319A5240}" dt="2020-09-30T20:37:22.869" v="1532" actId="20577"/>
+          <ac:spMkLst>
+            <pc:docMk/>
+            <pc:sldMk cId="2960734336" sldId="259"/>
+            <ac:spMk id="60" creationId="{9310B17B-EDDD-4E3A-9FAA-417C7D39FBA8}"/>
+          </ac:spMkLst>
+        </pc:spChg>
+        <pc:spChg chg="mod">
+          <ac:chgData name="cesar" userId="10cb0cc1dc347670" providerId="LiveId" clId="{C9C805C9-4D07-4BD9-AFF9-9C03319A5240}" dt="2020-09-30T20:38:27.856" v="1577" actId="20577"/>
+          <ac:spMkLst>
+            <pc:docMk/>
+            <pc:sldMk cId="2960734336" sldId="259"/>
+            <ac:spMk id="61" creationId="{7F8886C6-0AAC-4F4A-9664-754370AE9CEB}"/>
+          </ac:spMkLst>
+        </pc:spChg>
+        <pc:spChg chg="del mod topLvl">
+          <ac:chgData name="cesar" userId="10cb0cc1dc347670" providerId="LiveId" clId="{C9C805C9-4D07-4BD9-AFF9-9C03319A5240}" dt="2020-09-30T20:46:25.587" v="1785" actId="478"/>
+          <ac:spMkLst>
+            <pc:docMk/>
+            <pc:sldMk cId="2960734336" sldId="259"/>
+            <ac:spMk id="63" creationId="{EFEE3773-77CE-466B-A4F2-D23D8512E45A}"/>
+          </ac:spMkLst>
+        </pc:spChg>
+        <pc:spChg chg="del mod topLvl">
+          <ac:chgData name="cesar" userId="10cb0cc1dc347670" providerId="LiveId" clId="{C9C805C9-4D07-4BD9-AFF9-9C03319A5240}" dt="2020-09-30T20:46:39.950" v="1787" actId="478"/>
+          <ac:spMkLst>
+            <pc:docMk/>
+            <pc:sldMk cId="2960734336" sldId="259"/>
+            <ac:spMk id="64" creationId="{3D127514-E199-43C8-8DC4-118FAA6AEDCA}"/>
+          </ac:spMkLst>
+        </pc:spChg>
+        <pc:spChg chg="mod">
+          <ac:chgData name="cesar" userId="10cb0cc1dc347670" providerId="LiveId" clId="{C9C805C9-4D07-4BD9-AFF9-9C03319A5240}" dt="2020-09-30T20:41:58.117" v="1717" actId="20577"/>
+          <ac:spMkLst>
+            <pc:docMk/>
+            <pc:sldMk cId="2960734336" sldId="259"/>
+            <ac:spMk id="66" creationId="{0AC48279-7A6B-46D4-AD76-742326E579EA}"/>
+          </ac:spMkLst>
+        </pc:spChg>
+        <pc:spChg chg="mod">
+          <ac:chgData name="cesar" userId="10cb0cc1dc347670" providerId="LiveId" clId="{C9C805C9-4D07-4BD9-AFF9-9C03319A5240}" dt="2020-09-30T20:42:24.871" v="1776" actId="20577"/>
+          <ac:spMkLst>
+            <pc:docMk/>
+            <pc:sldMk cId="2960734336" sldId="259"/>
+            <ac:spMk id="67" creationId="{1348822B-2E83-4D9E-BAF6-D74D459A2125}"/>
+          </ac:spMkLst>
+        </pc:spChg>
+        <pc:spChg chg="del mod">
+          <ac:chgData name="cesar" userId="10cb0cc1dc347670" providerId="LiveId" clId="{C9C805C9-4D07-4BD9-AFF9-9C03319A5240}" dt="2020-09-30T20:04:45.738" v="579" actId="478"/>
+          <ac:spMkLst>
+            <pc:docMk/>
+            <pc:sldMk cId="2960734336" sldId="259"/>
+            <ac:spMk id="1066" creationId="{429DE240-5EC0-4BDF-9D31-9851D3BFB70C}"/>
+          </ac:spMkLst>
+        </pc:spChg>
+        <pc:spChg chg="del">
+          <ac:chgData name="cesar" userId="10cb0cc1dc347670" providerId="LiveId" clId="{C9C805C9-4D07-4BD9-AFF9-9C03319A5240}" dt="2020-09-30T20:04:47.270" v="580" actId="478"/>
+          <ac:spMkLst>
+            <pc:docMk/>
+            <pc:sldMk cId="2960734336" sldId="259"/>
+            <ac:spMk id="1067" creationId="{7DB5C331-0D98-426F-803D-FC1D2944EE34}"/>
+          </ac:spMkLst>
+        </pc:spChg>
+        <pc:spChg chg="del">
+          <ac:chgData name="cesar" userId="10cb0cc1dc347670" providerId="LiveId" clId="{C9C805C9-4D07-4BD9-AFF9-9C03319A5240}" dt="2020-09-30T20:05:49.276" v="613" actId="478"/>
+          <ac:spMkLst>
+            <pc:docMk/>
+            <pc:sldMk cId="2960734336" sldId="259"/>
+            <ac:spMk id="1068" creationId="{552C0F2A-90A4-4169-BF53-618FF4CF037E}"/>
+          </ac:spMkLst>
+        </pc:spChg>
+        <pc:spChg chg="del">
+          <ac:chgData name="cesar" userId="10cb0cc1dc347670" providerId="LiveId" clId="{C9C805C9-4D07-4BD9-AFF9-9C03319A5240}" dt="2020-09-30T20:05:51.698" v="615" actId="478"/>
+          <ac:spMkLst>
+            <pc:docMk/>
+            <pc:sldMk cId="2960734336" sldId="259"/>
+            <ac:spMk id="1069" creationId="{14E271A9-F283-4947-BC4F-AEF148A1ABC2}"/>
+          </ac:spMkLst>
+        </pc:spChg>
+        <pc:spChg chg="del">
+          <ac:chgData name="cesar" userId="10cb0cc1dc347670" providerId="LiveId" clId="{C9C805C9-4D07-4BD9-AFF9-9C03319A5240}" dt="2020-09-30T20:05:53.595" v="617" actId="478"/>
+          <ac:spMkLst>
+            <pc:docMk/>
+            <pc:sldMk cId="2960734336" sldId="259"/>
+            <ac:spMk id="1070" creationId="{2FBD6112-27C1-4B7B-9AA7-CDE8EC0D49A6}"/>
+          </ac:spMkLst>
+        </pc:spChg>
+        <pc:spChg chg="del">
+          <ac:chgData name="cesar" userId="10cb0cc1dc347670" providerId="LiveId" clId="{C9C805C9-4D07-4BD9-AFF9-9C03319A5240}" dt="2020-09-30T20:05:47.129" v="611" actId="478"/>
+          <ac:spMkLst>
+            <pc:docMk/>
+            <pc:sldMk cId="2960734336" sldId="259"/>
+            <ac:spMk id="1074" creationId="{4F56CED7-C417-48C7-92BA-910900937E5C}"/>
+          </ac:spMkLst>
+        </pc:spChg>
+        <pc:grpChg chg="add del mod">
+          <ac:chgData name="cesar" userId="10cb0cc1dc347670" providerId="LiveId" clId="{C9C805C9-4D07-4BD9-AFF9-9C03319A5240}" dt="2020-09-30T20:46:16.696" v="1781" actId="478"/>
+          <ac:grpSpMkLst>
+            <pc:docMk/>
+            <pc:sldMk cId="2960734336" sldId="259"/>
+            <ac:grpSpMk id="17" creationId="{500CF38C-5D93-4A29-BD52-D466FDF7FC6E}"/>
+          </ac:grpSpMkLst>
+        </pc:grpChg>
+        <pc:grpChg chg="add del mod">
+          <ac:chgData name="cesar" userId="10cb0cc1dc347670" providerId="LiveId" clId="{C9C805C9-4D07-4BD9-AFF9-9C03319A5240}" dt="2020-09-30T20:46:20.356" v="1782" actId="478"/>
+          <ac:grpSpMkLst>
+            <pc:docMk/>
+            <pc:sldMk cId="2960734336" sldId="259"/>
+            <ac:grpSpMk id="18" creationId="{5AC926D5-1784-4BAA-B834-A91AC9146467}"/>
+          </ac:grpSpMkLst>
+        </pc:grpChg>
+        <pc:grpChg chg="add del mod">
+          <ac:chgData name="cesar" userId="10cb0cc1dc347670" providerId="LiveId" clId="{C9C805C9-4D07-4BD9-AFF9-9C03319A5240}" dt="2020-09-30T20:46:21.731" v="1783" actId="478"/>
+          <ac:grpSpMkLst>
+            <pc:docMk/>
+            <pc:sldMk cId="2960734336" sldId="259"/>
+            <ac:grpSpMk id="55" creationId="{C526DDED-01F4-414C-81D8-7D95986AC4C3}"/>
+          </ac:grpSpMkLst>
+        </pc:grpChg>
+        <pc:grpChg chg="add del mod">
+          <ac:chgData name="cesar" userId="10cb0cc1dc347670" providerId="LiveId" clId="{C9C805C9-4D07-4BD9-AFF9-9C03319A5240}" dt="2020-09-30T20:46:23.370" v="1784" actId="478"/>
+          <ac:grpSpMkLst>
+            <pc:docMk/>
+            <pc:sldMk cId="2960734336" sldId="259"/>
+            <ac:grpSpMk id="59" creationId="{8EA67A84-B981-4D6D-A096-282FB996EE6E}"/>
+          </ac:grpSpMkLst>
+        </pc:grpChg>
+        <pc:grpChg chg="add del mod">
+          <ac:chgData name="cesar" userId="10cb0cc1dc347670" providerId="LiveId" clId="{C9C805C9-4D07-4BD9-AFF9-9C03319A5240}" dt="2020-09-30T20:46:25.587" v="1785" actId="478"/>
+          <ac:grpSpMkLst>
+            <pc:docMk/>
+            <pc:sldMk cId="2960734336" sldId="259"/>
+            <ac:grpSpMk id="62" creationId="{8B6D3B47-C0D6-4C49-BA32-1FFFF6BF1767}"/>
+          </ac:grpSpMkLst>
+        </pc:grpChg>
+        <pc:grpChg chg="add del mod">
+          <ac:chgData name="cesar" userId="10cb0cc1dc347670" providerId="LiveId" clId="{C9C805C9-4D07-4BD9-AFF9-9C03319A5240}" dt="2020-09-30T20:46:27.408" v="1786" actId="478"/>
+          <ac:grpSpMkLst>
+            <pc:docMk/>
+            <pc:sldMk cId="2960734336" sldId="259"/>
+            <ac:grpSpMk id="65" creationId="{CFD48BD1-792B-4957-974D-D008AA2D2FD6}"/>
+          </ac:grpSpMkLst>
+        </pc:grpChg>
+        <pc:grpChg chg="mod">
+          <ac:chgData name="cesar" userId="10cb0cc1dc347670" providerId="LiveId" clId="{C9C805C9-4D07-4BD9-AFF9-9C03319A5240}" dt="2020-09-30T20:35:40.263" v="1462" actId="1076"/>
+          <ac:grpSpMkLst>
+            <pc:docMk/>
+            <pc:sldMk cId="2960734336" sldId="259"/>
+            <ac:grpSpMk id="1046" creationId="{A4249804-3756-42AB-B43A-158CE5C1247E}"/>
+          </ac:grpSpMkLst>
+        </pc:grpChg>
+        <pc:grpChg chg="mod">
+          <ac:chgData name="cesar" userId="10cb0cc1dc347670" providerId="LiveId" clId="{C9C805C9-4D07-4BD9-AFF9-9C03319A5240}" dt="2020-09-30T20:34:58.329" v="1442" actId="1076"/>
+          <ac:grpSpMkLst>
+            <pc:docMk/>
+            <pc:sldMk cId="2960734336" sldId="259"/>
+            <ac:grpSpMk id="1047" creationId="{7201FF5C-7925-49BC-BA2E-CA2BEBC30877}"/>
+          </ac:grpSpMkLst>
+        </pc:grpChg>
+        <pc:grpChg chg="mod">
+          <ac:chgData name="cesar" userId="10cb0cc1dc347670" providerId="LiveId" clId="{C9C805C9-4D07-4BD9-AFF9-9C03319A5240}" dt="2020-09-30T20:34:43.903" v="1437" actId="1076"/>
+          <ac:grpSpMkLst>
+            <pc:docMk/>
+            <pc:sldMk cId="2960734336" sldId="259"/>
+            <ac:grpSpMk id="1049" creationId="{39D142FA-1C95-45B6-8551-76384EF7E83E}"/>
+          </ac:grpSpMkLst>
+        </pc:grpChg>
+        <pc:picChg chg="add mod">
+          <ac:chgData name="cesar" userId="10cb0cc1dc347670" providerId="LiveId" clId="{C9C805C9-4D07-4BD9-AFF9-9C03319A5240}" dt="2020-09-30T20:34:56.759" v="1441" actId="1076"/>
+          <ac:picMkLst>
+            <pc:docMk/>
+            <pc:sldMk cId="2960734336" sldId="259"/>
+            <ac:picMk id="2" creationId="{A8B6FA33-2990-4E5B-9F6D-66D07DA8152F}"/>
+          </ac:picMkLst>
+        </pc:picChg>
+        <pc:picChg chg="add mod">
+          <ac:chgData name="cesar" userId="10cb0cc1dc347670" providerId="LiveId" clId="{C9C805C9-4D07-4BD9-AFF9-9C03319A5240}" dt="2020-09-30T20:35:03.374" v="1444" actId="1076"/>
+          <ac:picMkLst>
+            <pc:docMk/>
+            <pc:sldMk cId="2960734336" sldId="259"/>
+            <ac:picMk id="4" creationId="{D1298C77-30FA-466A-993F-2F73F87BE0A9}"/>
+          </ac:picMkLst>
+        </pc:picChg>
+        <pc:picChg chg="add mod">
+          <ac:chgData name="cesar" userId="10cb0cc1dc347670" providerId="LiveId" clId="{C9C805C9-4D07-4BD9-AFF9-9C03319A5240}" dt="2020-09-30T20:35:38.974" v="1461" actId="1076"/>
+          <ac:picMkLst>
+            <pc:docMk/>
+            <pc:sldMk cId="2960734336" sldId="259"/>
+            <ac:picMk id="5" creationId="{B10E0BA4-F09F-42F5-B7E4-CFBFE31ECDA9}"/>
+          </ac:picMkLst>
+        </pc:picChg>
+        <pc:picChg chg="add mod">
+          <ac:chgData name="cesar" userId="10cb0cc1dc347670" providerId="LiveId" clId="{C9C805C9-4D07-4BD9-AFF9-9C03319A5240}" dt="2020-09-30T20:39:07.423" v="1591" actId="1076"/>
+          <ac:picMkLst>
+            <pc:docMk/>
+            <pc:sldMk cId="2960734336" sldId="259"/>
+            <ac:picMk id="6" creationId="{E516DFE2-BF9A-4AFD-964D-2FB600976EE3}"/>
+          </ac:picMkLst>
+        </pc:picChg>
+        <pc:picChg chg="add mod">
+          <ac:chgData name="cesar" userId="10cb0cc1dc347670" providerId="LiveId" clId="{C9C805C9-4D07-4BD9-AFF9-9C03319A5240}" dt="2020-09-30T20:38:42.974" v="1579" actId="1076"/>
+          <ac:picMkLst>
+            <pc:docMk/>
+            <pc:sldMk cId="2960734336" sldId="259"/>
+            <ac:picMk id="8" creationId="{0FE7D18B-52CF-4114-912A-9D7C97867BF9}"/>
+          </ac:picMkLst>
+        </pc:picChg>
+        <pc:picChg chg="mod">
+          <ac:chgData name="cesar" userId="10cb0cc1dc347670" providerId="LiveId" clId="{C9C805C9-4D07-4BD9-AFF9-9C03319A5240}" dt="2020-09-30T20:37:00.063" v="1519" actId="1076"/>
+          <ac:picMkLst>
+            <pc:docMk/>
+            <pc:sldMk cId="2960734336" sldId="259"/>
+            <ac:picMk id="23" creationId="{C0EB4E6C-8DCB-4626-91F9-2C4B9601A635}"/>
+          </ac:picMkLst>
+        </pc:picChg>
+        <pc:picChg chg="mod">
+          <ac:chgData name="cesar" userId="10cb0cc1dc347670" providerId="LiveId" clId="{C9C805C9-4D07-4BD9-AFF9-9C03319A5240}" dt="2020-09-30T20:35:15.983" v="1452" actId="1076"/>
+          <ac:picMkLst>
+            <pc:docMk/>
+            <pc:sldMk cId="2960734336" sldId="259"/>
+            <ac:picMk id="1028" creationId="{A99E5A0F-2A0E-43EE-852E-F5E5511A6067}"/>
+          </ac:picMkLst>
+        </pc:picChg>
+        <pc:picChg chg="mod">
+          <ac:chgData name="cesar" userId="10cb0cc1dc347670" providerId="LiveId" clId="{C9C805C9-4D07-4BD9-AFF9-9C03319A5240}" dt="2020-09-30T20:39:13.766" v="1594" actId="1076"/>
+          <ac:picMkLst>
+            <pc:docMk/>
+            <pc:sldMk cId="2960734336" sldId="259"/>
+            <ac:picMk id="1038" creationId="{0C30F01B-CD60-4F47-AAD8-241790227307}"/>
+          </ac:picMkLst>
+        </pc:picChg>
+        <pc:picChg chg="mod">
+          <ac:chgData name="cesar" userId="10cb0cc1dc347670" providerId="LiveId" clId="{C9C805C9-4D07-4BD9-AFF9-9C03319A5240}" dt="2020-09-30T20:34:43.903" v="1437" actId="1076"/>
+          <ac:picMkLst>
+            <pc:docMk/>
+            <pc:sldMk cId="2960734336" sldId="259"/>
+            <ac:picMk id="1043" creationId="{2D495B21-1587-47C2-9587-AD5565F6B90C}"/>
+          </ac:picMkLst>
+        </pc:picChg>
+        <pc:picChg chg="mod">
+          <ac:chgData name="cesar" userId="10cb0cc1dc347670" providerId="LiveId" clId="{C9C805C9-4D07-4BD9-AFF9-9C03319A5240}" dt="2020-09-30T20:34:43.903" v="1437" actId="1076"/>
+          <ac:picMkLst>
+            <pc:docMk/>
+            <pc:sldMk cId="2960734336" sldId="259"/>
+            <ac:picMk id="1045" creationId="{53B8F879-63FC-4C54-AA77-14EABE2954C0}"/>
+          </ac:picMkLst>
+        </pc:picChg>
+        <pc:picChg chg="del">
+          <ac:chgData name="cesar" userId="10cb0cc1dc347670" providerId="LiveId" clId="{C9C805C9-4D07-4BD9-AFF9-9C03319A5240}" dt="2020-09-30T20:04:48.065" v="581" actId="478"/>
+          <ac:picMkLst>
+            <pc:docMk/>
+            <pc:sldMk cId="2960734336" sldId="259"/>
+            <ac:picMk id="1057" creationId="{E7A57177-8ADC-4445-8A0F-AE03BD9E9D1C}"/>
+          </ac:picMkLst>
+        </pc:picChg>
+        <pc:picChg chg="del">
+          <ac:chgData name="cesar" userId="10cb0cc1dc347670" providerId="LiveId" clId="{C9C805C9-4D07-4BD9-AFF9-9C03319A5240}" dt="2020-09-30T20:04:44.317" v="578" actId="478"/>
+          <ac:picMkLst>
+            <pc:docMk/>
+            <pc:sldMk cId="2960734336" sldId="259"/>
+            <ac:picMk id="1058" creationId="{5166FDF0-E1C1-41B2-B6C5-73FC4CD3D3F3}"/>
+          </ac:picMkLst>
+        </pc:picChg>
+        <pc:picChg chg="del">
+          <ac:chgData name="cesar" userId="10cb0cc1dc347670" providerId="LiveId" clId="{C9C805C9-4D07-4BD9-AFF9-9C03319A5240}" dt="2020-09-30T20:05:50.272" v="614" actId="478"/>
+          <ac:picMkLst>
+            <pc:docMk/>
+            <pc:sldMk cId="2960734336" sldId="259"/>
+            <ac:picMk id="1059" creationId="{E784D167-F281-4C0F-81C5-127730E90899}"/>
+          </ac:picMkLst>
+        </pc:picChg>
+        <pc:picChg chg="del">
+          <ac:chgData name="cesar" userId="10cb0cc1dc347670" providerId="LiveId" clId="{C9C805C9-4D07-4BD9-AFF9-9C03319A5240}" dt="2020-09-30T20:05:52.400" v="616" actId="478"/>
+          <ac:picMkLst>
+            <pc:docMk/>
+            <pc:sldMk cId="2960734336" sldId="259"/>
+            <ac:picMk id="1060" creationId="{7E4F0076-7D7D-4D19-B020-0936952B7842}"/>
+          </ac:picMkLst>
+        </pc:picChg>
+        <pc:picChg chg="del">
+          <ac:chgData name="cesar" userId="10cb0cc1dc347670" providerId="LiveId" clId="{C9C805C9-4D07-4BD9-AFF9-9C03319A5240}" dt="2020-09-30T20:05:54.438" v="618" actId="478"/>
+          <ac:picMkLst>
+            <pc:docMk/>
+            <pc:sldMk cId="2960734336" sldId="259"/>
+            <ac:picMk id="1061" creationId="{5D9257E6-2E2B-4F45-86F6-DB65EA238FE0}"/>
+          </ac:picMkLst>
+        </pc:picChg>
+        <pc:picChg chg="del">
+          <ac:chgData name="cesar" userId="10cb0cc1dc347670" providerId="LiveId" clId="{C9C805C9-4D07-4BD9-AFF9-9C03319A5240}" dt="2020-09-30T20:05:48.262" v="612" actId="478"/>
+          <ac:picMkLst>
+            <pc:docMk/>
+            <pc:sldMk cId="2960734336" sldId="259"/>
+            <ac:picMk id="1073" creationId="{353FB280-1D8A-46C9-87F3-C1D2303AF04D}"/>
+          </ac:picMkLst>
+        </pc:picChg>
+        <pc:picChg chg="add mod">
+          <ac:chgData name="cesar" userId="10cb0cc1dc347670" providerId="LiveId" clId="{C9C805C9-4D07-4BD9-AFF9-9C03319A5240}" dt="2020-09-30T20:34:42.912" v="1436" actId="1076"/>
+          <ac:picMkLst>
+            <pc:docMk/>
+            <pc:sldMk cId="2960734336" sldId="259"/>
+            <ac:picMk id="2050" creationId="{BCBCDFAE-F102-4F2C-A763-C535754511B9}"/>
+          </ac:picMkLst>
+        </pc:picChg>
+      </pc:sldChg>
+      <pc:sldChg chg="new del">
+        <pc:chgData name="cesar" userId="10cb0cc1dc347670" providerId="LiveId" clId="{C9C805C9-4D07-4BD9-AFF9-9C03319A5240}" dt="2020-09-30T20:04:00.205" v="563" actId="680"/>
+        <pc:sldMkLst>
+          <pc:docMk/>
+          <pc:sldMk cId="3004829916" sldId="259"/>
+        </pc:sldMkLst>
+      </pc:sldChg>
+    </pc:docChg>
+  </pc:docChgLst>
+</pc:chgInfo>
+</file>
+
+<file path=ppt/notesMasters/notesMaster1.xml><?xml version="1.0" encoding="utf-8"?>
+<p:notesMaster xmlns:a="http://schemas.openxmlformats.org/drawingml/2006/main" xmlns:r="http://schemas.openxmlformats.org/officeDocument/2006/relationships" xmlns:p="http://schemas.openxmlformats.org/presentationml/2006/main">
+  <p:cSld>
+    <p:bg>
+      <p:bgRef idx="1001">
+        <a:schemeClr val="bg1"/>
+      </p:bgRef>
+    </p:bg>
+    <p:spTree>
+      <p:nvGrpSpPr>
+        <p:cNvPr id="1" name=""/>
+        <p:cNvGrpSpPr/>
+        <p:nvPr/>
+      </p:nvGrpSpPr>
+      <p:grpSpPr>
+        <a:xfrm>
+          <a:off x="0" y="0"/>
+          <a:ext cx="0" cy="0"/>
+          <a:chOff x="0" y="0"/>
+          <a:chExt cx="0" cy="0"/>
+        </a:xfrm>
+      </p:grpSpPr>
+      <p:sp>
+        <p:nvSpPr>
+          <p:cNvPr id="2" name="Espaço Reservado para Cabeçalho 1"/>
+          <p:cNvSpPr>
+            <a:spLocks noGrp="1"/>
+          </p:cNvSpPr>
+          <p:nvPr>
+            <p:ph type="hdr" sz="quarter"/>
+          </p:nvPr>
+        </p:nvSpPr>
+        <p:spPr>
+          <a:xfrm>
+            <a:off x="0" y="0"/>
+            <a:ext cx="2971800" cy="458788"/>
+          </a:xfrm>
+          <a:prstGeom prst="rect">
+            <a:avLst/>
+          </a:prstGeom>
+        </p:spPr>
+        <p:txBody>
+          <a:bodyPr vert="horz" lIns="91440" tIns="45720" rIns="91440" bIns="45720" rtlCol="0"/>
+          <a:lstStyle>
+            <a:lvl1pPr algn="l">
+              <a:defRPr sz="1200"/>
+            </a:lvl1pPr>
+          </a:lstStyle>
+          <a:p>
+            <a:endParaRPr lang="pt-BR"/>
+          </a:p>
+        </p:txBody>
+      </p:sp>
+      <p:sp>
+        <p:nvSpPr>
+          <p:cNvPr id="3" name="Espaço Reservado para Data 2"/>
+          <p:cNvSpPr>
+            <a:spLocks noGrp="1"/>
+          </p:cNvSpPr>
+          <p:nvPr>
+            <p:ph type="dt" idx="1"/>
+          </p:nvPr>
+        </p:nvSpPr>
+        <p:spPr>
+          <a:xfrm>
+            <a:off x="3884613" y="0"/>
+            <a:ext cx="2971800" cy="458788"/>
+          </a:xfrm>
+          <a:prstGeom prst="rect">
+            <a:avLst/>
+          </a:prstGeom>
+        </p:spPr>
+        <p:txBody>
+          <a:bodyPr vert="horz" lIns="91440" tIns="45720" rIns="91440" bIns="45720" rtlCol="0"/>
+          <a:lstStyle>
+            <a:lvl1pPr algn="r">
+              <a:defRPr sz="1200"/>
+            </a:lvl1pPr>
+          </a:lstStyle>
+          <a:p>
+            <a:fld id="{0C5D9D58-D740-4366-A977-17C0763281B4}" type="datetimeFigureOut">
+              <a:rPr lang="pt-BR" smtClean="0"/>
+              <a:t>30/09/2020</a:t>
+            </a:fld>
+            <a:endParaRPr lang="pt-BR"/>
+          </a:p>
+        </p:txBody>
+      </p:sp>
+      <p:sp>
+        <p:nvSpPr>
+          <p:cNvPr id="4" name="Espaço Reservado para Imagem de Slide 3"/>
+          <p:cNvSpPr>
+            <a:spLocks noGrp="1" noRot="1" noChangeAspect="1"/>
+          </p:cNvSpPr>
+          <p:nvPr>
+            <p:ph type="sldImg" idx="2"/>
+          </p:nvPr>
+        </p:nvSpPr>
+        <p:spPr>
+          <a:xfrm>
+            <a:off x="685800" y="1143000"/>
+            <a:ext cx="5486400" cy="3086100"/>
+          </a:xfrm>
+          <a:prstGeom prst="rect">
+            <a:avLst/>
+          </a:prstGeom>
+          <a:noFill/>
+          <a:ln w="12700">
+            <a:solidFill>
+              <a:prstClr val="black"/>
+            </a:solidFill>
+          </a:ln>
+        </p:spPr>
+        <p:txBody>
+          <a:bodyPr vert="horz" lIns="91440" tIns="45720" rIns="91440" bIns="45720" rtlCol="0" anchor="ctr"/>
+          <a:lstStyle/>
+          <a:p>
+            <a:endParaRPr lang="pt-BR"/>
+          </a:p>
+        </p:txBody>
+      </p:sp>
+      <p:sp>
+        <p:nvSpPr>
+          <p:cNvPr id="5" name="Espaço Reservado para Anotações 4"/>
+          <p:cNvSpPr>
+            <a:spLocks noGrp="1"/>
+          </p:cNvSpPr>
+          <p:nvPr>
+            <p:ph type="body" sz="quarter" idx="3"/>
+          </p:nvPr>
+        </p:nvSpPr>
+        <p:spPr>
+          <a:xfrm>
+            <a:off x="685800" y="4400550"/>
+            <a:ext cx="5486400" cy="3600450"/>
+          </a:xfrm>
+          <a:prstGeom prst="rect">
+            <a:avLst/>
+          </a:prstGeom>
+        </p:spPr>
+        <p:txBody>
+          <a:bodyPr vert="horz" lIns="91440" tIns="45720" rIns="91440" bIns="45720" rtlCol="0"/>
+          <a:lstStyle/>
+          <a:p>
+            <a:pPr lvl="0"/>
+            <a:r>
+              <a:rPr lang="pt-BR"/>
+              <a:t>Clique para editar os estilos de texto Mestres</a:t>
+            </a:r>
+          </a:p>
+          <a:p>
+            <a:pPr lvl="1"/>
+            <a:r>
+              <a:rPr lang="pt-BR"/>
+              <a:t>Segundo nível</a:t>
+            </a:r>
+          </a:p>
+          <a:p>
+            <a:pPr lvl="2"/>
+            <a:r>
+              <a:rPr lang="pt-BR"/>
+              <a:t>Terceiro nível</a:t>
+            </a:r>
+          </a:p>
+          <a:p>
+            <a:pPr lvl="3"/>
+            <a:r>
+              <a:rPr lang="pt-BR"/>
+              <a:t>Quarto nível</a:t>
+            </a:r>
+          </a:p>
+          <a:p>
+            <a:pPr lvl="4"/>
+            <a:r>
+              <a:rPr lang="pt-BR"/>
+              <a:t>Quinto nível</a:t>
+            </a:r>
+          </a:p>
+        </p:txBody>
+      </p:sp>
+      <p:sp>
+        <p:nvSpPr>
+          <p:cNvPr id="6" name="Espaço Reservado para Rodapé 5"/>
+          <p:cNvSpPr>
+            <a:spLocks noGrp="1"/>
+          </p:cNvSpPr>
+          <p:nvPr>
+            <p:ph type="ftr" sz="quarter" idx="4"/>
+          </p:nvPr>
+        </p:nvSpPr>
+        <p:spPr>
+          <a:xfrm>
+            <a:off x="0" y="8685213"/>
+            <a:ext cx="2971800" cy="458787"/>
+          </a:xfrm>
+          <a:prstGeom prst="rect">
+            <a:avLst/>
+          </a:prstGeom>
+        </p:spPr>
+        <p:txBody>
+          <a:bodyPr vert="horz" lIns="91440" tIns="45720" rIns="91440" bIns="45720" rtlCol="0" anchor="b"/>
+          <a:lstStyle>
+            <a:lvl1pPr algn="l">
+              <a:defRPr sz="1200"/>
+            </a:lvl1pPr>
+          </a:lstStyle>
+          <a:p>
+            <a:endParaRPr lang="pt-BR"/>
+          </a:p>
+        </p:txBody>
+      </p:sp>
+      <p:sp>
+        <p:nvSpPr>
+          <p:cNvPr id="7" name="Espaço Reservado para Número de Slide 6"/>
+          <p:cNvSpPr>
+            <a:spLocks noGrp="1"/>
+          </p:cNvSpPr>
+          <p:nvPr>
+            <p:ph type="sldNum" sz="quarter" idx="5"/>
+          </p:nvPr>
+        </p:nvSpPr>
+        <p:spPr>
+          <a:xfrm>
+            <a:off x="3884613" y="8685213"/>
+            <a:ext cx="2971800" cy="458787"/>
+          </a:xfrm>
+          <a:prstGeom prst="rect">
+            <a:avLst/>
+          </a:prstGeom>
+        </p:spPr>
+        <p:txBody>
+          <a:bodyPr vert="horz" lIns="91440" tIns="45720" rIns="91440" bIns="45720" rtlCol="0" anchor="b"/>
+          <a:lstStyle>
+            <a:lvl1pPr algn="r">
+              <a:defRPr sz="1200"/>
+            </a:lvl1pPr>
+          </a:lstStyle>
+          <a:p>
+            <a:fld id="{F636993D-BDB6-49D9-BE6F-11790E9E9E4E}" type="slidenum">
+              <a:rPr lang="pt-BR" smtClean="0"/>
+              <a:t>‹nº›</a:t>
+            </a:fld>
+            <a:endParaRPr lang="pt-BR"/>
+          </a:p>
+        </p:txBody>
+      </p:sp>
+    </p:spTree>
+    <p:extLst>
+      <p:ext uri="{BB962C8B-B14F-4D97-AF65-F5344CB8AC3E}">
+        <p14:creationId xmlns:p14="http://schemas.microsoft.com/office/powerpoint/2010/main" val="3214930385"/>
+      </p:ext>
+    </p:extLst>
+  </p:cSld>
+  <p:clrMap bg1="lt1" tx1="dk1" bg2="lt2" tx2="dk2" accent1="accent1" accent2="accent2" accent3="accent3" accent4="accent4" accent5="accent5" accent6="accent6" hlink="hlink" folHlink="folHlink"/>
+  <p:notesStyle>
+    <a:lvl1pPr marL="0" algn="l" defTabSz="914400" rtl="0" eaLnBrk="1" latinLnBrk="0" hangingPunct="1">
+      <a:defRPr sz="1200" kern="1200">
+        <a:solidFill>
+          <a:schemeClr val="tx1"/>
+        </a:solidFill>
+        <a:latin typeface="+mn-lt"/>
+        <a:ea typeface="+mn-ea"/>
+        <a:cs typeface="+mn-cs"/>
+      </a:defRPr>
+    </a:lvl1pPr>
+    <a:lvl2pPr marL="457200" algn="l" defTabSz="914400" rtl="0" eaLnBrk="1" latinLnBrk="0" hangingPunct="1">
+      <a:defRPr sz="1200" kern="1200">
+        <a:solidFill>
+          <a:schemeClr val="tx1"/>
+        </a:solidFill>
+        <a:latin typeface="+mn-lt"/>
+        <a:ea typeface="+mn-ea"/>
+        <a:cs typeface="+mn-cs"/>
+      </a:defRPr>
+    </a:lvl2pPr>
+    <a:lvl3pPr marL="914400" algn="l" defTabSz="914400" rtl="0" eaLnBrk="1" latinLnBrk="0" hangingPunct="1">
+      <a:defRPr sz="1200" kern="1200">
+        <a:solidFill>
+          <a:schemeClr val="tx1"/>
+        </a:solidFill>
+        <a:latin typeface="+mn-lt"/>
+        <a:ea typeface="+mn-ea"/>
+        <a:cs typeface="+mn-cs"/>
+      </a:defRPr>
+    </a:lvl3pPr>
+    <a:lvl4pPr marL="1371600" algn="l" defTabSz="914400" rtl="0" eaLnBrk="1" latinLnBrk="0" hangingPunct="1">
+      <a:defRPr sz="1200" kern="1200">
+        <a:solidFill>
+          <a:schemeClr val="tx1"/>
+        </a:solidFill>
+        <a:latin typeface="+mn-lt"/>
+        <a:ea typeface="+mn-ea"/>
+        <a:cs typeface="+mn-cs"/>
+      </a:defRPr>
+    </a:lvl4pPr>
+    <a:lvl5pPr marL="1828800" algn="l" defTabSz="914400" rtl="0" eaLnBrk="1" latinLnBrk="0" hangingPunct="1">
+      <a:defRPr sz="1200" kern="1200">
+        <a:solidFill>
+          <a:schemeClr val="tx1"/>
+        </a:solidFill>
+        <a:latin typeface="+mn-lt"/>
+        <a:ea typeface="+mn-ea"/>
+        <a:cs typeface="+mn-cs"/>
+      </a:defRPr>
+    </a:lvl5pPr>
+    <a:lvl6pPr marL="2286000" algn="l" defTabSz="914400" rtl="0" eaLnBrk="1" latinLnBrk="0" hangingPunct="1">
+      <a:defRPr sz="1200" kern="1200">
+        <a:solidFill>
+          <a:schemeClr val="tx1"/>
+        </a:solidFill>
+        <a:latin typeface="+mn-lt"/>
+        <a:ea typeface="+mn-ea"/>
+        <a:cs typeface="+mn-cs"/>
+      </a:defRPr>
+    </a:lvl6pPr>
+    <a:lvl7pPr marL="2743200" algn="l" defTabSz="914400" rtl="0" eaLnBrk="1" latinLnBrk="0" hangingPunct="1">
+      <a:defRPr sz="1200" kern="1200">
+        <a:solidFill>
+          <a:schemeClr val="tx1"/>
+        </a:solidFill>
+        <a:latin typeface="+mn-lt"/>
+        <a:ea typeface="+mn-ea"/>
+        <a:cs typeface="+mn-cs"/>
+      </a:defRPr>
+    </a:lvl7pPr>
+    <a:lvl8pPr marL="3200400" algn="l" defTabSz="914400" rtl="0" eaLnBrk="1" latinLnBrk="0" hangingPunct="1">
+      <a:defRPr sz="1200" kern="1200">
+        <a:solidFill>
+          <a:schemeClr val="tx1"/>
+        </a:solidFill>
+        <a:latin typeface="+mn-lt"/>
+        <a:ea typeface="+mn-ea"/>
+        <a:cs typeface="+mn-cs"/>
+      </a:defRPr>
+    </a:lvl8pPr>
+    <a:lvl9pPr marL="3657600" algn="l" defTabSz="914400" rtl="0" eaLnBrk="1" latinLnBrk="0" hangingPunct="1">
+      <a:defRPr sz="1200" kern="1200">
+        <a:solidFill>
+          <a:schemeClr val="tx1"/>
+        </a:solidFill>
+        <a:latin typeface="+mn-lt"/>
+        <a:ea typeface="+mn-ea"/>
+        <a:cs typeface="+mn-cs"/>
+      </a:defRPr>
+    </a:lvl9pPr>
+  </p:notesStyle>
+</p:notesMaster>
+</file>
+
 <file path=ppt/slideLayouts/slideLayout1.xml><?xml version="1.0" encoding="utf-8"?>
 <p:sldLayout xmlns:a="http://schemas.openxmlformats.org/drawingml/2006/main" xmlns:r="http://schemas.openxmlformats.org/officeDocument/2006/relationships" xmlns:p="http://schemas.openxmlformats.org/presentationml/2006/main" type="title" preserve="1">
   <p:cSld name="Slide de Título">
@@ -259,7 +1589,7 @@
           <a:p>
             <a:fld id="{F5EB898D-A655-4B60-9070-B87E7C0538D4}" type="datetimeFigureOut">
               <a:rPr lang="pt-BR" smtClean="0"/>
-              <a:t>28/09/2020</a:t>
+              <a:t>30/09/2020</a:t>
             </a:fld>
             <a:endParaRPr lang="pt-BR"/>
           </a:p>
@@ -457,7 +1787,7 @@
           <a:p>
             <a:fld id="{F5EB898D-A655-4B60-9070-B87E7C0538D4}" type="datetimeFigureOut">
               <a:rPr lang="pt-BR" smtClean="0"/>
-              <a:t>28/09/2020</a:t>
+              <a:t>30/09/2020</a:t>
             </a:fld>
             <a:endParaRPr lang="pt-BR"/>
           </a:p>
@@ -665,7 +1995,7 @@
           <a:p>
             <a:fld id="{F5EB898D-A655-4B60-9070-B87E7C0538D4}" type="datetimeFigureOut">
               <a:rPr lang="pt-BR" smtClean="0"/>
-              <a:t>28/09/2020</a:t>
+              <a:t>30/09/2020</a:t>
             </a:fld>
             <a:endParaRPr lang="pt-BR"/>
           </a:p>
@@ -863,7 +2193,7 @@
           <a:p>
             <a:fld id="{F5EB898D-A655-4B60-9070-B87E7C0538D4}" type="datetimeFigureOut">
               <a:rPr lang="pt-BR" smtClean="0"/>
-              <a:t>28/09/2020</a:t>
+              <a:t>30/09/2020</a:t>
             </a:fld>
             <a:endParaRPr lang="pt-BR"/>
           </a:p>
@@ -1138,7 +2468,7 @@
           <a:p>
             <a:fld id="{F5EB898D-A655-4B60-9070-B87E7C0538D4}" type="datetimeFigureOut">
               <a:rPr lang="pt-BR" smtClean="0"/>
-              <a:t>28/09/2020</a:t>
+              <a:t>30/09/2020</a:t>
             </a:fld>
             <a:endParaRPr lang="pt-BR"/>
           </a:p>
@@ -1403,7 +2733,7 @@
           <a:p>
             <a:fld id="{F5EB898D-A655-4B60-9070-B87E7C0538D4}" type="datetimeFigureOut">
               <a:rPr lang="pt-BR" smtClean="0"/>
-              <a:t>28/09/2020</a:t>
+              <a:t>30/09/2020</a:t>
             </a:fld>
             <a:endParaRPr lang="pt-BR"/>
           </a:p>
@@ -1815,7 +3145,7 @@
           <a:p>
             <a:fld id="{F5EB898D-A655-4B60-9070-B87E7C0538D4}" type="datetimeFigureOut">
               <a:rPr lang="pt-BR" smtClean="0"/>
-              <a:t>28/09/2020</a:t>
+              <a:t>30/09/2020</a:t>
             </a:fld>
             <a:endParaRPr lang="pt-BR"/>
           </a:p>
@@ -1956,7 +3286,7 @@
           <a:p>
             <a:fld id="{F5EB898D-A655-4B60-9070-B87E7C0538D4}" type="datetimeFigureOut">
               <a:rPr lang="pt-BR" smtClean="0"/>
-              <a:t>28/09/2020</a:t>
+              <a:t>30/09/2020</a:t>
             </a:fld>
             <a:endParaRPr lang="pt-BR"/>
           </a:p>
@@ -2069,7 +3399,7 @@
           <a:p>
             <a:fld id="{F5EB898D-A655-4B60-9070-B87E7C0538D4}" type="datetimeFigureOut">
               <a:rPr lang="pt-BR" smtClean="0"/>
-              <a:t>28/09/2020</a:t>
+              <a:t>30/09/2020</a:t>
             </a:fld>
             <a:endParaRPr lang="pt-BR"/>
           </a:p>
@@ -2380,7 +3710,7 @@
           <a:p>
             <a:fld id="{F5EB898D-A655-4B60-9070-B87E7C0538D4}" type="datetimeFigureOut">
               <a:rPr lang="pt-BR" smtClean="0"/>
-              <a:t>28/09/2020</a:t>
+              <a:t>30/09/2020</a:t>
             </a:fld>
             <a:endParaRPr lang="pt-BR"/>
           </a:p>
@@ -2668,7 +3998,7 @@
           <a:p>
             <a:fld id="{F5EB898D-A655-4B60-9070-B87E7C0538D4}" type="datetimeFigureOut">
               <a:rPr lang="pt-BR" smtClean="0"/>
-              <a:t>28/09/2020</a:t>
+              <a:t>30/09/2020</a:t>
             </a:fld>
             <a:endParaRPr lang="pt-BR"/>
           </a:p>
@@ -2909,7 +4239,7 @@
           <a:p>
             <a:fld id="{F5EB898D-A655-4B60-9070-B87E7C0538D4}" type="datetimeFigureOut">
               <a:rPr lang="pt-BR" smtClean="0"/>
-              <a:t>28/09/2020</a:t>
+              <a:t>30/09/2020</a:t>
             </a:fld>
             <a:endParaRPr lang="pt-BR"/>
           </a:p>
@@ -3328,10 +4658,10 @@
       </p:grpSpPr>
       <p:pic>
         <p:nvPicPr>
-          <p:cNvPr id="12" name="Imagem 11" descr="Uma imagem contendo Forma&#10;&#10;Descrição gerada automaticamente">
-            <a:extLst>
-              <a:ext uri="{FF2B5EF4-FFF2-40B4-BE49-F238E27FC236}">
-                <a16:creationId xmlns:a16="http://schemas.microsoft.com/office/drawing/2014/main" id="{74A5AF6B-91CE-4F99-9322-DF7359404A42}"/>
+          <p:cNvPr id="23" name="Imagem 22" descr="Uma imagem contendo Ícone&#10;&#10;Descrição gerada automaticamente">
+            <a:extLst>
+              <a:ext uri="{FF2B5EF4-FFF2-40B4-BE49-F238E27FC236}">
+                <a16:creationId xmlns:a16="http://schemas.microsoft.com/office/drawing/2014/main" id="{C0EB4E6C-8DCB-4626-91F9-2C4B9601A635}"/>
               </a:ext>
             </a:extLst>
           </p:cNvPr>
@@ -3353,117 +4683,9 @@
           </a:stretch>
         </p:blipFill>
         <p:spPr>
-          <a:xfrm rot="16654855">
-            <a:off x="5262882" y="3125269"/>
-            <a:ext cx="576648" cy="576648"/>
-          </a:xfrm>
-          <a:prstGeom prst="rect">
-            <a:avLst/>
-          </a:prstGeom>
-        </p:spPr>
-      </p:pic>
-      <p:pic>
-        <p:nvPicPr>
-          <p:cNvPr id="20" name="Imagem 19" descr="Uma imagem contendo Forma&#10;&#10;Descrição gerada automaticamente">
-            <a:extLst>
-              <a:ext uri="{FF2B5EF4-FFF2-40B4-BE49-F238E27FC236}">
-                <a16:creationId xmlns:a16="http://schemas.microsoft.com/office/drawing/2014/main" id="{16D9C6DA-9344-48C9-BC3C-FFC00887F213}"/>
-              </a:ext>
-            </a:extLst>
-          </p:cNvPr>
-          <p:cNvPicPr>
-            <a:picLocks noChangeAspect="1"/>
-          </p:cNvPicPr>
-          <p:nvPr/>
-        </p:nvPicPr>
-        <p:blipFill>
-          <a:blip r:embed="rId2">
-            <a:extLst>
-              <a:ext uri="{28A0092B-C50C-407E-A947-70E740481C1C}">
-                <a14:useLocalDpi xmlns:a14="http://schemas.microsoft.com/office/drawing/2010/main" val="0"/>
-              </a:ext>
-            </a:extLst>
-          </a:blip>
-          <a:stretch>
-            <a:fillRect/>
-          </a:stretch>
-        </p:blipFill>
-        <p:spPr>
-          <a:xfrm rot="2670568">
-            <a:off x="1631607" y="4704611"/>
-            <a:ext cx="534819" cy="534819"/>
-          </a:xfrm>
-          <a:prstGeom prst="rect">
-            <a:avLst/>
-          </a:prstGeom>
-        </p:spPr>
-      </p:pic>
-      <p:pic>
-        <p:nvPicPr>
-          <p:cNvPr id="23" name="Imagem 22" descr="Uma imagem contendo Ícone&#10;&#10;Descrição gerada automaticamente">
-            <a:extLst>
-              <a:ext uri="{FF2B5EF4-FFF2-40B4-BE49-F238E27FC236}">
-                <a16:creationId xmlns:a16="http://schemas.microsoft.com/office/drawing/2014/main" id="{C0EB4E6C-8DCB-4626-91F9-2C4B9601A635}"/>
-              </a:ext>
-            </a:extLst>
-          </p:cNvPr>
-          <p:cNvPicPr>
-            <a:picLocks noChangeAspect="1"/>
-          </p:cNvPicPr>
-          <p:nvPr/>
-        </p:nvPicPr>
-        <p:blipFill>
-          <a:blip r:embed="rId3">
-            <a:extLst>
-              <a:ext uri="{28A0092B-C50C-407E-A947-70E740481C1C}">
-                <a14:useLocalDpi xmlns:a14="http://schemas.microsoft.com/office/drawing/2010/main" val="0"/>
-              </a:ext>
-            </a:extLst>
-          </a:blip>
-          <a:stretch>
-            <a:fillRect/>
-          </a:stretch>
-        </p:blipFill>
-        <p:spPr>
           <a:xfrm>
-            <a:off x="8522029" y="3715562"/>
+            <a:off x="9617665" y="336014"/>
             <a:ext cx="1225725" cy="1225725"/>
-          </a:xfrm>
-          <a:prstGeom prst="rect">
-            <a:avLst/>
-          </a:prstGeom>
-        </p:spPr>
-      </p:pic>
-      <p:pic>
-        <p:nvPicPr>
-          <p:cNvPr id="24" name="Imagem 23" descr="Uma imagem contendo Forma&#10;&#10;Descrição gerada automaticamente">
-            <a:extLst>
-              <a:ext uri="{FF2B5EF4-FFF2-40B4-BE49-F238E27FC236}">
-                <a16:creationId xmlns:a16="http://schemas.microsoft.com/office/drawing/2014/main" id="{EEC072D1-8F7B-4923-A1C0-D7721A4B00B1}"/>
-              </a:ext>
-            </a:extLst>
-          </p:cNvPr>
-          <p:cNvPicPr>
-            <a:picLocks noChangeAspect="1"/>
-          </p:cNvPicPr>
-          <p:nvPr/>
-        </p:nvPicPr>
-        <p:blipFill>
-          <a:blip r:embed="rId2">
-            <a:extLst>
-              <a:ext uri="{28A0092B-C50C-407E-A947-70E740481C1C}">
-                <a14:useLocalDpi xmlns:a14="http://schemas.microsoft.com/office/drawing/2010/main" val="0"/>
-              </a:ext>
-            </a:extLst>
-          </a:blip>
-          <a:stretch>
-            <a:fillRect/>
-          </a:stretch>
-        </p:blipFill>
-        <p:spPr>
-          <a:xfrm rot="2542567">
-            <a:off x="1589581" y="2185945"/>
-            <a:ext cx="576648" cy="575084"/>
           </a:xfrm>
           <a:prstGeom prst="rect">
             <a:avLst/>
@@ -3484,7 +4706,7 @@
         </p:nvGrpSpPr>
         <p:grpSpPr>
           <a:xfrm>
-            <a:off x="3693228" y="3200826"/>
+            <a:off x="4034482" y="2195768"/>
             <a:ext cx="1816910" cy="2110409"/>
             <a:chOff x="5618354" y="1894949"/>
             <a:chExt cx="2385391" cy="2793900"/>
@@ -3505,7 +4727,7 @@
             <p:nvPr/>
           </p:nvPicPr>
           <p:blipFill>
-            <a:blip r:embed="rId4">
+            <a:blip r:embed="rId3">
               <a:extLst>
                 <a:ext uri="{28A0092B-C50C-407E-A947-70E740481C1C}">
                   <a14:useLocalDpi xmlns:a14="http://schemas.microsoft.com/office/drawing/2010/main" val="0"/>
@@ -3541,7 +4763,7 @@
             <p:nvPr/>
           </p:nvPicPr>
           <p:blipFill>
-            <a:blip r:embed="rId5">
+            <a:blip r:embed="rId4">
               <a:extLst>
                 <a:ext uri="{28A0092B-C50C-407E-A947-70E740481C1C}">
                   <a14:useLocalDpi xmlns:a14="http://schemas.microsoft.com/office/drawing/2010/main" val="0"/>
@@ -3578,7 +4800,7 @@
           <p:nvPr/>
         </p:nvPicPr>
         <p:blipFill>
-          <a:blip r:embed="rId6">
+          <a:blip r:embed="rId5">
             <a:extLst>
               <a:ext uri="{28A0092B-C50C-407E-A947-70E740481C1C}">
                 <a14:useLocalDpi xmlns:a14="http://schemas.microsoft.com/office/drawing/2010/main" val="0"/>
@@ -3591,44 +4813,8 @@
         </p:blipFill>
         <p:spPr>
           <a:xfrm>
-            <a:off x="1296046" y="5451060"/>
+            <a:off x="5202066" y="5494138"/>
             <a:ext cx="1324979" cy="1324979"/>
-          </a:xfrm>
-          <a:prstGeom prst="rect">
-            <a:avLst/>
-          </a:prstGeom>
-        </p:spPr>
-      </p:pic>
-      <p:pic>
-        <p:nvPicPr>
-          <p:cNvPr id="1029" name="Imagem 1028" descr="Uma imagem contendo Forma&#10;&#10;Descrição gerada automaticamente">
-            <a:extLst>
-              <a:ext uri="{FF2B5EF4-FFF2-40B4-BE49-F238E27FC236}">
-                <a16:creationId xmlns:a16="http://schemas.microsoft.com/office/drawing/2014/main" id="{ABBD97BA-B3B3-4A56-8696-3F9FE06394C7}"/>
-              </a:ext>
-            </a:extLst>
-          </p:cNvPr>
-          <p:cNvPicPr>
-            <a:picLocks noChangeAspect="1"/>
-          </p:cNvPicPr>
-          <p:nvPr/>
-        </p:nvPicPr>
-        <p:blipFill>
-          <a:blip r:embed="rId2">
-            <a:extLst>
-              <a:ext uri="{28A0092B-C50C-407E-A947-70E740481C1C}">
-                <a14:useLocalDpi xmlns:a14="http://schemas.microsoft.com/office/drawing/2010/main" val="0"/>
-              </a:ext>
-            </a:extLst>
-          </a:blip>
-          <a:stretch>
-            <a:fillRect/>
-          </a:stretch>
-        </p:blipFill>
-        <p:spPr>
-          <a:xfrm rot="16390069">
-            <a:off x="2904587" y="5012868"/>
-            <a:ext cx="488066" cy="488066"/>
           </a:xfrm>
           <a:prstGeom prst="rect">
             <a:avLst/>
@@ -3649,7 +4835,7 @@
         </p:nvGrpSpPr>
         <p:grpSpPr>
           <a:xfrm>
-            <a:off x="5875048" y="1910715"/>
+            <a:off x="8454635" y="5047896"/>
             <a:ext cx="1324979" cy="1537773"/>
             <a:chOff x="9727145" y="3123658"/>
             <a:chExt cx="1324979" cy="1537773"/>
@@ -3670,7 +4856,7 @@
             <p:nvPr/>
           </p:nvPicPr>
           <p:blipFill>
-            <a:blip r:embed="rId7">
+            <a:blip r:embed="rId6">
               <a:extLst>
                 <a:ext uri="{28A0092B-C50C-407E-A947-70E740481C1C}">
                   <a14:useLocalDpi xmlns:a14="http://schemas.microsoft.com/office/drawing/2010/main" val="0"/>
@@ -3706,7 +4892,7 @@
             <p:nvPr/>
           </p:nvPicPr>
           <p:blipFill>
-            <a:blip r:embed="rId8">
+            <a:blip r:embed="rId7">
               <a:extLst>
                 <a:ext uri="{28A0092B-C50C-407E-A947-70E740481C1C}">
                   <a14:useLocalDpi xmlns:a14="http://schemas.microsoft.com/office/drawing/2010/main" val="0"/>
@@ -3742,7 +4928,7 @@
             <p:nvPr/>
           </p:nvPicPr>
           <p:blipFill>
-            <a:blip r:embed="rId9">
+            <a:blip r:embed="rId8">
               <a:extLst>
                 <a:ext uri="{28A0092B-C50C-407E-A947-70E740481C1C}">
                   <a14:useLocalDpi xmlns:a14="http://schemas.microsoft.com/office/drawing/2010/main" val="0"/>
@@ -3779,7 +4965,7 @@
           <p:nvPr/>
         </p:nvPicPr>
         <p:blipFill>
-          <a:blip r:embed="rId10">
+          <a:blip r:embed="rId9">
             <a:extLst>
               <a:ext uri="{28A0092B-C50C-407E-A947-70E740481C1C}">
                 <a14:useLocalDpi xmlns:a14="http://schemas.microsoft.com/office/drawing/2010/main" val="0"/>
@@ -3792,80 +4978,8 @@
         </p:blipFill>
         <p:spPr>
           <a:xfrm>
-            <a:off x="8482001" y="932680"/>
+            <a:off x="8679215" y="2762414"/>
             <a:ext cx="938450" cy="1097504"/>
-          </a:xfrm>
-          <a:prstGeom prst="rect">
-            <a:avLst/>
-          </a:prstGeom>
-        </p:spPr>
-      </p:pic>
-      <p:pic>
-        <p:nvPicPr>
-          <p:cNvPr id="1039" name="Imagem 1038" descr="Uma imagem contendo Forma&#10;&#10;Descrição gerada automaticamente">
-            <a:extLst>
-              <a:ext uri="{FF2B5EF4-FFF2-40B4-BE49-F238E27FC236}">
-                <a16:creationId xmlns:a16="http://schemas.microsoft.com/office/drawing/2014/main" id="{42719BBA-B76E-404D-A05F-8CEC1379EDBD}"/>
-              </a:ext>
-            </a:extLst>
-          </p:cNvPr>
-          <p:cNvPicPr>
-            <a:picLocks noChangeAspect="1"/>
-          </p:cNvPicPr>
-          <p:nvPr/>
-        </p:nvPicPr>
-        <p:blipFill>
-          <a:blip r:embed="rId2">
-            <a:extLst>
-              <a:ext uri="{28A0092B-C50C-407E-A947-70E740481C1C}">
-                <a14:useLocalDpi xmlns:a14="http://schemas.microsoft.com/office/drawing/2010/main" val="0"/>
-              </a:ext>
-            </a:extLst>
-          </a:blip>
-          <a:stretch>
-            <a:fillRect/>
-          </a:stretch>
-        </p:blipFill>
-        <p:spPr>
-          <a:xfrm rot="16767145">
-            <a:off x="7536952" y="1664938"/>
-            <a:ext cx="491091" cy="491091"/>
-          </a:xfrm>
-          <a:prstGeom prst="rect">
-            <a:avLst/>
-          </a:prstGeom>
-        </p:spPr>
-      </p:pic>
-      <p:pic>
-        <p:nvPicPr>
-          <p:cNvPr id="1040" name="Imagem 1039" descr="Uma imagem contendo Forma&#10;&#10;Descrição gerada automaticamente">
-            <a:extLst>
-              <a:ext uri="{FF2B5EF4-FFF2-40B4-BE49-F238E27FC236}">
-                <a16:creationId xmlns:a16="http://schemas.microsoft.com/office/drawing/2014/main" id="{F04F234A-F355-4E39-96CC-8D1A5C03275E}"/>
-              </a:ext>
-            </a:extLst>
-          </p:cNvPr>
-          <p:cNvPicPr>
-            <a:picLocks noChangeAspect="1"/>
-          </p:cNvPicPr>
-          <p:nvPr/>
-        </p:nvPicPr>
-        <p:blipFill>
-          <a:blip r:embed="rId2">
-            <a:extLst>
-              <a:ext uri="{28A0092B-C50C-407E-A947-70E740481C1C}">
-                <a14:useLocalDpi xmlns:a14="http://schemas.microsoft.com/office/drawing/2010/main" val="0"/>
-              </a:ext>
-            </a:extLst>
-          </a:blip>
-          <a:stretch>
-            <a:fillRect/>
-          </a:stretch>
-        </p:blipFill>
-        <p:spPr>
-          <a:xfrm rot="2903893">
-            <a:off x="8725807" y="2479563"/>
-            <a:ext cx="612870" cy="612870"/>
           </a:xfrm>
           <a:prstGeom prst="rect">
             <a:avLst/>
@@ -3886,7 +5000,7 @@
         </p:nvGrpSpPr>
         <p:grpSpPr>
           <a:xfrm>
-            <a:off x="1258651" y="3284234"/>
+            <a:off x="2777325" y="644464"/>
             <a:ext cx="1000541" cy="1344164"/>
             <a:chOff x="6836319" y="1023714"/>
             <a:chExt cx="1000541" cy="1344164"/>
@@ -3898,6 +5012,53 @@
               <a:extLst>
                 <a:ext uri="{FF2B5EF4-FFF2-40B4-BE49-F238E27FC236}">
                   <a16:creationId xmlns:a16="http://schemas.microsoft.com/office/drawing/2014/main" id="{2D495B21-1587-47C2-9587-AD5565F6B90C}"/>
+                </a:ext>
+              </a:extLst>
+            </p:cNvPr>
+            <p:cNvPicPr>
+              <a:picLocks noChangeAspect="1" noChangeArrowheads="1"/>
+            </p:cNvPicPr>
+            <p:nvPr/>
+          </p:nvPicPr>
+          <p:blipFill>
+            <a:blip r:embed="rId10">
+              <a:extLst>
+                <a:ext uri="{28A0092B-C50C-407E-A947-70E740481C1C}">
+                  <a14:useLocalDpi xmlns:a14="http://schemas.microsoft.com/office/drawing/2010/main" val="0"/>
+                </a:ext>
+              </a:extLst>
+            </a:blip>
+            <a:srcRect/>
+            <a:stretch>
+              <a:fillRect/>
+            </a:stretch>
+          </p:blipFill>
+          <p:spPr bwMode="auto">
+            <a:xfrm>
+              <a:off x="6836319" y="1367337"/>
+              <a:ext cx="1000541" cy="1000541"/>
+            </a:xfrm>
+            <a:prstGeom prst="rect">
+              <a:avLst/>
+            </a:prstGeom>
+            <a:noFill/>
+            <a:extLst>
+              <a:ext uri="{909E8E84-426E-40DD-AFC4-6F175D3DCCD1}">
+                <a14:hiddenFill xmlns:a14="http://schemas.microsoft.com/office/drawing/2010/main">
+                  <a:solidFill>
+                    <a:srgbClr val="FFFFFF"/>
+                  </a:solidFill>
+                </a14:hiddenFill>
+              </a:ext>
+            </a:extLst>
+          </p:spPr>
+        </p:pic>
+        <p:pic>
+          <p:nvPicPr>
+            <p:cNvPr id="1045" name="Picture 16">
+              <a:extLst>
+                <a:ext uri="{FF2B5EF4-FFF2-40B4-BE49-F238E27FC236}">
+                  <a16:creationId xmlns:a16="http://schemas.microsoft.com/office/drawing/2014/main" id="{53B8F879-63FC-4C54-AA77-14EABE2954C0}"/>
                 </a:ext>
               </a:extLst>
             </p:cNvPr>
@@ -3921,53 +5082,6 @@
           </p:blipFill>
           <p:spPr bwMode="auto">
             <a:xfrm>
-              <a:off x="6836319" y="1367337"/>
-              <a:ext cx="1000541" cy="1000541"/>
-            </a:xfrm>
-            <a:prstGeom prst="rect">
-              <a:avLst/>
-            </a:prstGeom>
-            <a:noFill/>
-            <a:extLst>
-              <a:ext uri="{909E8E84-426E-40DD-AFC4-6F175D3DCCD1}">
-                <a14:hiddenFill xmlns:a14="http://schemas.microsoft.com/office/drawing/2010/main">
-                  <a:solidFill>
-                    <a:srgbClr val="FFFFFF"/>
-                  </a:solidFill>
-                </a14:hiddenFill>
-              </a:ext>
-            </a:extLst>
-          </p:spPr>
-        </p:pic>
-        <p:pic>
-          <p:nvPicPr>
-            <p:cNvPr id="1045" name="Picture 16">
-              <a:extLst>
-                <a:ext uri="{FF2B5EF4-FFF2-40B4-BE49-F238E27FC236}">
-                  <a16:creationId xmlns:a16="http://schemas.microsoft.com/office/drawing/2014/main" id="{53B8F879-63FC-4C54-AA77-14EABE2954C0}"/>
-                </a:ext>
-              </a:extLst>
-            </p:cNvPr>
-            <p:cNvPicPr>
-              <a:picLocks noChangeAspect="1" noChangeArrowheads="1"/>
-            </p:cNvPicPr>
-            <p:nvPr/>
-          </p:nvPicPr>
-          <p:blipFill>
-            <a:blip r:embed="rId12">
-              <a:extLst>
-                <a:ext uri="{28A0092B-C50C-407E-A947-70E740481C1C}">
-                  <a14:useLocalDpi xmlns:a14="http://schemas.microsoft.com/office/drawing/2010/main" val="0"/>
-                </a:ext>
-              </a:extLst>
-            </a:blip>
-            <a:srcRect/>
-            <a:stretch>
-              <a:fillRect/>
-            </a:stretch>
-          </p:blipFill>
-          <p:spPr bwMode="auto">
-            <a:xfrm>
               <a:off x="7368005" y="1023714"/>
               <a:ext cx="453200" cy="453200"/>
             </a:xfrm>
@@ -4001,7 +5115,7 @@
         </p:nvGrpSpPr>
         <p:grpSpPr>
           <a:xfrm>
-            <a:off x="1106102" y="17197"/>
+            <a:off x="380864" y="2276200"/>
             <a:ext cx="1778484" cy="1635338"/>
             <a:chOff x="5289727" y="104433"/>
             <a:chExt cx="1778484" cy="1635338"/>
@@ -4022,7 +5136,7 @@
             <p:nvPr/>
           </p:nvPicPr>
           <p:blipFill>
-            <a:blip r:embed="rId7">
+            <a:blip r:embed="rId6">
               <a:extLst>
                 <a:ext uri="{28A0092B-C50C-407E-A947-70E740481C1C}">
                   <a14:useLocalDpi xmlns:a14="http://schemas.microsoft.com/office/drawing/2010/main" val="0"/>
@@ -4058,7 +5172,7 @@
             <p:nvPr/>
           </p:nvPicPr>
           <p:blipFill>
-            <a:blip r:embed="rId13">
+            <a:blip r:embed="rId12">
               <a:extLst>
                 <a:ext uri="{28A0092B-C50C-407E-A947-70E740481C1C}">
                   <a14:useLocalDpi xmlns:a14="http://schemas.microsoft.com/office/drawing/2010/main" val="0"/>
@@ -4071,7 +5185,7 @@
           </p:blipFill>
           <p:spPr>
             <a:xfrm>
-              <a:off x="5488600" y="450243"/>
+              <a:off x="5483562" y="439742"/>
               <a:ext cx="1110476" cy="569673"/>
             </a:xfrm>
             <a:prstGeom prst="rect">
@@ -4094,7 +5208,7 @@
             <p:nvPr/>
           </p:nvPicPr>
           <p:blipFill>
-            <a:blip r:embed="rId14">
+            <a:blip r:embed="rId13">
               <a:extLst>
                 <a:ext uri="{28A0092B-C50C-407E-A947-70E740481C1C}">
                   <a14:useLocalDpi xmlns:a14="http://schemas.microsoft.com/office/drawing/2010/main" val="0"/>
@@ -4116,10 +5230,337 @@
           </p:spPr>
         </p:pic>
       </p:grpSp>
+      <p:sp>
+        <p:nvSpPr>
+          <p:cNvPr id="10" name="AutoShape 2" descr="Curve arrow free icon">
+            <a:extLst>
+              <a:ext uri="{FF2B5EF4-FFF2-40B4-BE49-F238E27FC236}">
+                <a16:creationId xmlns:a16="http://schemas.microsoft.com/office/drawing/2014/main" id="{BFF79DE1-16D0-4440-840B-FEEADE02B969}"/>
+              </a:ext>
+            </a:extLst>
+          </p:cNvPr>
+          <p:cNvSpPr>
+            <a:spLocks noChangeAspect="1" noChangeArrowheads="1"/>
+          </p:cNvSpPr>
+          <p:nvPr/>
+        </p:nvSpPr>
+        <p:spPr bwMode="auto">
+          <a:xfrm>
+            <a:off x="5943601" y="3756553"/>
+            <a:ext cx="4410222" cy="4410222"/>
+          </a:xfrm>
+          <a:prstGeom prst="rect">
+            <a:avLst/>
+          </a:prstGeom>
+          <a:noFill/>
+          <a:extLst>
+            <a:ext uri="{909E8E84-426E-40DD-AFC4-6F175D3DCCD1}">
+              <a14:hiddenFill xmlns:a14="http://schemas.microsoft.com/office/drawing/2010/main">
+                <a:solidFill>
+                  <a:srgbClr val="FFFFFF"/>
+                </a:solidFill>
+              </a14:hiddenFill>
+            </a:ext>
+          </a:extLst>
+        </p:spPr>
+        <p:txBody>
+          <a:bodyPr vert="horz" wrap="square" lIns="91440" tIns="45720" rIns="91440" bIns="45720" numCol="1" anchor="t" anchorCtr="0" compatLnSpc="1">
+            <a:prstTxWarp prst="textNoShape">
+              <a:avLst/>
+            </a:prstTxWarp>
+          </a:bodyPr>
+          <a:lstStyle/>
+          <a:p>
+            <a:endParaRPr lang="pt-BR"/>
+          </a:p>
+        </p:txBody>
+      </p:sp>
+      <p:pic>
+        <p:nvPicPr>
+          <p:cNvPr id="2050" name="Picture 2">
+            <a:extLst>
+              <a:ext uri="{FF2B5EF4-FFF2-40B4-BE49-F238E27FC236}">
+                <a16:creationId xmlns:a16="http://schemas.microsoft.com/office/drawing/2014/main" id="{BCBCDFAE-F102-4F2C-A763-C535754511B9}"/>
+              </a:ext>
+            </a:extLst>
+          </p:cNvPr>
+          <p:cNvPicPr>
+            <a:picLocks noChangeAspect="1" noChangeArrowheads="1"/>
+          </p:cNvPicPr>
+          <p:nvPr/>
+        </p:nvPicPr>
+        <p:blipFill>
+          <a:blip r:embed="rId14">
+            <a:extLst>
+              <a:ext uri="{28A0092B-C50C-407E-A947-70E740481C1C}">
+                <a14:useLocalDpi xmlns:a14="http://schemas.microsoft.com/office/drawing/2010/main" val="0"/>
+              </a:ext>
+            </a:extLst>
+          </a:blip>
+          <a:srcRect/>
+          <a:stretch>
+            <a:fillRect/>
+          </a:stretch>
+        </p:blipFill>
+        <p:spPr bwMode="auto">
+          <a:xfrm rot="9675058" flipV="1">
+            <a:off x="1469216" y="1339942"/>
+            <a:ext cx="1308908" cy="571798"/>
+          </a:xfrm>
+          <a:prstGeom prst="rect">
+            <a:avLst/>
+          </a:prstGeom>
+          <a:noFill/>
+          <a:extLst>
+            <a:ext uri="{909E8E84-426E-40DD-AFC4-6F175D3DCCD1}">
+              <a14:hiddenFill xmlns:a14="http://schemas.microsoft.com/office/drawing/2010/main">
+                <a:solidFill>
+                  <a:srgbClr val="FFFFFF"/>
+                </a:solidFill>
+              </a14:hiddenFill>
+            </a:ext>
+          </a:extLst>
+        </p:spPr>
+      </p:pic>
+      <p:pic>
+        <p:nvPicPr>
+          <p:cNvPr id="2" name="Picture 2">
+            <a:extLst>
+              <a:ext uri="{FF2B5EF4-FFF2-40B4-BE49-F238E27FC236}">
+                <a16:creationId xmlns:a16="http://schemas.microsoft.com/office/drawing/2014/main" id="{A8B6FA33-2990-4E5B-9F6D-66D07DA8152F}"/>
+              </a:ext>
+            </a:extLst>
+          </p:cNvPr>
+          <p:cNvPicPr>
+            <a:picLocks noChangeAspect="1" noChangeArrowheads="1"/>
+          </p:cNvPicPr>
+          <p:nvPr/>
+        </p:nvPicPr>
+        <p:blipFill>
+          <a:blip r:embed="rId14">
+            <a:extLst>
+              <a:ext uri="{28A0092B-C50C-407E-A947-70E740481C1C}">
+                <a14:useLocalDpi xmlns:a14="http://schemas.microsoft.com/office/drawing/2010/main" val="0"/>
+              </a:ext>
+            </a:extLst>
+          </a:blip>
+          <a:srcRect/>
+          <a:stretch>
+            <a:fillRect/>
+          </a:stretch>
+        </p:blipFill>
+        <p:spPr bwMode="auto">
+          <a:xfrm rot="15333447" flipV="1">
+            <a:off x="3991649" y="1783725"/>
+            <a:ext cx="774611" cy="571798"/>
+          </a:xfrm>
+          <a:prstGeom prst="rect">
+            <a:avLst/>
+          </a:prstGeom>
+          <a:noFill/>
+          <a:extLst>
+            <a:ext uri="{909E8E84-426E-40DD-AFC4-6F175D3DCCD1}">
+              <a14:hiddenFill xmlns:a14="http://schemas.microsoft.com/office/drawing/2010/main">
+                <a:solidFill>
+                  <a:srgbClr val="FFFFFF"/>
+                </a:solidFill>
+              </a14:hiddenFill>
+            </a:ext>
+          </a:extLst>
+        </p:spPr>
+      </p:pic>
+      <p:pic>
+        <p:nvPicPr>
+          <p:cNvPr id="4" name="Picture 2">
+            <a:extLst>
+              <a:ext uri="{FF2B5EF4-FFF2-40B4-BE49-F238E27FC236}">
+                <a16:creationId xmlns:a16="http://schemas.microsoft.com/office/drawing/2014/main" id="{D1298C77-30FA-466A-993F-2F73F87BE0A9}"/>
+              </a:ext>
+            </a:extLst>
+          </p:cNvPr>
+          <p:cNvPicPr>
+            <a:picLocks noChangeAspect="1" noChangeArrowheads="1"/>
+          </p:cNvPicPr>
+          <p:nvPr/>
+        </p:nvPicPr>
+        <p:blipFill>
+          <a:blip r:embed="rId14">
+            <a:extLst>
+              <a:ext uri="{28A0092B-C50C-407E-A947-70E740481C1C}">
+                <a14:useLocalDpi xmlns:a14="http://schemas.microsoft.com/office/drawing/2010/main" val="0"/>
+              </a:ext>
+            </a:extLst>
+          </a:blip>
+          <a:srcRect/>
+          <a:stretch>
+            <a:fillRect/>
+          </a:stretch>
+        </p:blipFill>
+        <p:spPr bwMode="auto">
+          <a:xfrm rot="2824911" flipH="1" flipV="1">
+            <a:off x="4022612" y="4272254"/>
+            <a:ext cx="1390914" cy="1040490"/>
+          </a:xfrm>
+          <a:prstGeom prst="rect">
+            <a:avLst/>
+          </a:prstGeom>
+          <a:noFill/>
+          <a:extLst>
+            <a:ext uri="{909E8E84-426E-40DD-AFC4-6F175D3DCCD1}">
+              <a14:hiddenFill xmlns:a14="http://schemas.microsoft.com/office/drawing/2010/main">
+                <a:solidFill>
+                  <a:srgbClr val="FFFFFF"/>
+                </a:solidFill>
+              </a14:hiddenFill>
+            </a:ext>
+          </a:extLst>
+        </p:spPr>
+      </p:pic>
+      <p:pic>
+        <p:nvPicPr>
+          <p:cNvPr id="5" name="Picture 2">
+            <a:extLst>
+              <a:ext uri="{FF2B5EF4-FFF2-40B4-BE49-F238E27FC236}">
+                <a16:creationId xmlns:a16="http://schemas.microsoft.com/office/drawing/2014/main" id="{B10E0BA4-F09F-42F5-B7E4-CFBFE31ECDA9}"/>
+              </a:ext>
+            </a:extLst>
+          </p:cNvPr>
+          <p:cNvPicPr>
+            <a:picLocks noChangeAspect="1" noChangeArrowheads="1"/>
+          </p:cNvPicPr>
+          <p:nvPr/>
+        </p:nvPicPr>
+        <p:blipFill>
+          <a:blip r:embed="rId14">
+            <a:extLst>
+              <a:ext uri="{28A0092B-C50C-407E-A947-70E740481C1C}">
+                <a14:useLocalDpi xmlns:a14="http://schemas.microsoft.com/office/drawing/2010/main" val="0"/>
+              </a:ext>
+            </a:extLst>
+          </a:blip>
+          <a:srcRect/>
+          <a:stretch>
+            <a:fillRect/>
+          </a:stretch>
+        </p:blipFill>
+        <p:spPr bwMode="auto">
+          <a:xfrm rot="9675058">
+            <a:off x="6866947" y="5887658"/>
+            <a:ext cx="1247786" cy="545097"/>
+          </a:xfrm>
+          <a:prstGeom prst="rect">
+            <a:avLst/>
+          </a:prstGeom>
+          <a:noFill/>
+          <a:extLst>
+            <a:ext uri="{909E8E84-426E-40DD-AFC4-6F175D3DCCD1}">
+              <a14:hiddenFill xmlns:a14="http://schemas.microsoft.com/office/drawing/2010/main">
+                <a:solidFill>
+                  <a:srgbClr val="FFFFFF"/>
+                </a:solidFill>
+              </a14:hiddenFill>
+            </a:ext>
+          </a:extLst>
+        </p:spPr>
+      </p:pic>
+      <p:pic>
+        <p:nvPicPr>
+          <p:cNvPr id="6" name="Picture 2">
+            <a:extLst>
+              <a:ext uri="{FF2B5EF4-FFF2-40B4-BE49-F238E27FC236}">
+                <a16:creationId xmlns:a16="http://schemas.microsoft.com/office/drawing/2014/main" id="{E516DFE2-BF9A-4AFD-964D-2FB600976EE3}"/>
+              </a:ext>
+            </a:extLst>
+          </p:cNvPr>
+          <p:cNvPicPr>
+            <a:picLocks noChangeAspect="1" noChangeArrowheads="1"/>
+          </p:cNvPicPr>
+          <p:nvPr/>
+        </p:nvPicPr>
+        <p:blipFill>
+          <a:blip r:embed="rId14">
+            <a:extLst>
+              <a:ext uri="{28A0092B-C50C-407E-A947-70E740481C1C}">
+                <a14:useLocalDpi xmlns:a14="http://schemas.microsoft.com/office/drawing/2010/main" val="0"/>
+              </a:ext>
+            </a:extLst>
+          </a:blip>
+          <a:srcRect/>
+          <a:stretch>
+            <a:fillRect/>
+          </a:stretch>
+        </p:blipFill>
+        <p:spPr bwMode="auto">
+          <a:xfrm rot="4534170">
+            <a:off x="9319636" y="4215195"/>
+            <a:ext cx="945379" cy="531221"/>
+          </a:xfrm>
+          <a:prstGeom prst="rect">
+            <a:avLst/>
+          </a:prstGeom>
+          <a:noFill/>
+          <a:extLst>
+            <a:ext uri="{909E8E84-426E-40DD-AFC4-6F175D3DCCD1}">
+              <a14:hiddenFill xmlns:a14="http://schemas.microsoft.com/office/drawing/2010/main">
+                <a:solidFill>
+                  <a:srgbClr val="FFFFFF"/>
+                </a:solidFill>
+              </a14:hiddenFill>
+            </a:ext>
+          </a:extLst>
+        </p:spPr>
+      </p:pic>
+      <p:pic>
+        <p:nvPicPr>
+          <p:cNvPr id="8" name="Picture 2">
+            <a:extLst>
+              <a:ext uri="{FF2B5EF4-FFF2-40B4-BE49-F238E27FC236}">
+                <a16:creationId xmlns:a16="http://schemas.microsoft.com/office/drawing/2014/main" id="{0FE7D18B-52CF-4114-912A-9D7C97867BF9}"/>
+              </a:ext>
+            </a:extLst>
+          </p:cNvPr>
+          <p:cNvPicPr>
+            <a:picLocks noChangeAspect="1" noChangeArrowheads="1"/>
+          </p:cNvPicPr>
+          <p:nvPr/>
+        </p:nvPicPr>
+        <p:blipFill>
+          <a:blip r:embed="rId14">
+            <a:extLst>
+              <a:ext uri="{28A0092B-C50C-407E-A947-70E740481C1C}">
+                <a14:useLocalDpi xmlns:a14="http://schemas.microsoft.com/office/drawing/2010/main" val="0"/>
+              </a:ext>
+            </a:extLst>
+          </a:blip>
+          <a:srcRect/>
+          <a:stretch>
+            <a:fillRect/>
+          </a:stretch>
+        </p:blipFill>
+        <p:spPr bwMode="auto">
+          <a:xfrm rot="7977078" flipV="1">
+            <a:off x="8795071" y="1652775"/>
+            <a:ext cx="831478" cy="814938"/>
+          </a:xfrm>
+          <a:prstGeom prst="rect">
+            <a:avLst/>
+          </a:prstGeom>
+          <a:noFill/>
+          <a:extLst>
+            <a:ext uri="{909E8E84-426E-40DD-AFC4-6F175D3DCCD1}">
+              <a14:hiddenFill xmlns:a14="http://schemas.microsoft.com/office/drawing/2010/main">
+                <a:solidFill>
+                  <a:srgbClr val="FFFFFF"/>
+                </a:solidFill>
+              </a14:hiddenFill>
+            </a:ext>
+          </a:extLst>
+        </p:spPr>
+      </p:pic>
     </p:spTree>
     <p:extLst>
       <p:ext uri="{BB962C8B-B14F-4D97-AF65-F5344CB8AC3E}">
-        <p14:creationId xmlns:p14="http://schemas.microsoft.com/office/powerpoint/2010/main" val="1015834183"/>
+        <p14:creationId xmlns:p14="http://schemas.microsoft.com/office/powerpoint/2010/main" val="2960734336"/>
       </p:ext>
     </p:extLst>
   </p:cSld>
@@ -4414,6 +5855,327 @@
       </a:bgFillStyleLst>
     </a:fmtScheme>
   </a:themeElements>
+  <a:objectDefaults>
+    <a:lnDef>
+      <a:spPr>
+        <a:ln w="66675">
+          <a:solidFill>
+            <a:schemeClr val="tx1"/>
+          </a:solidFill>
+        </a:ln>
+      </a:spPr>
+      <a:bodyPr/>
+      <a:lstStyle/>
+      <a:style>
+        <a:lnRef idx="1">
+          <a:schemeClr val="accent1"/>
+        </a:lnRef>
+        <a:fillRef idx="0">
+          <a:schemeClr val="accent1"/>
+        </a:fillRef>
+        <a:effectRef idx="0">
+          <a:schemeClr val="accent1"/>
+        </a:effectRef>
+        <a:fontRef idx="minor">
+          <a:schemeClr val="tx1"/>
+        </a:fontRef>
+      </a:style>
+    </a:lnDef>
+  </a:objectDefaults>
+  <a:extraClrSchemeLst/>
+  <a:extLst>
+    <a:ext uri="{05A4C25C-085E-4340-85A3-A5531E510DB2}">
+      <thm15:themeFamily xmlns:thm15="http://schemas.microsoft.com/office/thememl/2012/main" name="Office Theme" id="{62F939B6-93AF-4DB8-9C6B-D6C7DFDC589F}" vid="{4A3C46E8-61CC-4603-A589-7422A47A8E4A}"/>
+    </a:ext>
+  </a:extLst>
+</a:theme>
+</file>
+
+<file path=ppt/theme/theme2.xml><?xml version="1.0" encoding="utf-8"?>
+<a:theme xmlns:a="http://schemas.openxmlformats.org/drawingml/2006/main" name="Tema do Office">
+  <a:themeElements>
+    <a:clrScheme name="Office">
+      <a:dk1>
+        <a:sysClr val="windowText" lastClr="000000"/>
+      </a:dk1>
+      <a:lt1>
+        <a:sysClr val="window" lastClr="FFFFFF"/>
+      </a:lt1>
+      <a:dk2>
+        <a:srgbClr val="44546A"/>
+      </a:dk2>
+      <a:lt2>
+        <a:srgbClr val="E7E6E6"/>
+      </a:lt2>
+      <a:accent1>
+        <a:srgbClr val="4472C4"/>
+      </a:accent1>
+      <a:accent2>
+        <a:srgbClr val="ED7D31"/>
+      </a:accent2>
+      <a:accent3>
+        <a:srgbClr val="A5A5A5"/>
+      </a:accent3>
+      <a:accent4>
+        <a:srgbClr val="FFC000"/>
+      </a:accent4>
+      <a:accent5>
+        <a:srgbClr val="5B9BD5"/>
+      </a:accent5>
+      <a:accent6>
+        <a:srgbClr val="70AD47"/>
+      </a:accent6>
+      <a:hlink>
+        <a:srgbClr val="0563C1"/>
+      </a:hlink>
+      <a:folHlink>
+        <a:srgbClr val="954F72"/>
+      </a:folHlink>
+    </a:clrScheme>
+    <a:fontScheme name="Office">
+      <a:majorFont>
+        <a:latin typeface="Calibri Light" panose="020F0302020204030204"/>
+        <a:ea typeface=""/>
+        <a:cs typeface=""/>
+        <a:font script="Jpan" typeface="游ゴシック Light"/>
+        <a:font script="Hang" typeface="맑은 고딕"/>
+        <a:font script="Hans" typeface="等线 Light"/>
+        <a:font script="Hant" typeface="新細明體"/>
+        <a:font script="Arab" typeface="Times New Roman"/>
+        <a:font script="Hebr" typeface="Times New Roman"/>
+        <a:font script="Thai" typeface="Angsana New"/>
+        <a:font script="Ethi" typeface="Nyala"/>
+        <a:font script="Beng" typeface="Vrinda"/>
+        <a:font script="Gujr" typeface="Shruti"/>
+        <a:font script="Khmr" typeface="MoolBoran"/>
+        <a:font script="Knda" typeface="Tunga"/>
+        <a:font script="Guru" typeface="Raavi"/>
+        <a:font script="Cans" typeface="Euphemia"/>
+        <a:font script="Cher" typeface="Plantagenet Cherokee"/>
+        <a:font script="Yiii" typeface="Microsoft Yi Baiti"/>
+        <a:font script="Tibt" typeface="Microsoft Himalaya"/>
+        <a:font script="Thaa" typeface="MV Boli"/>
+        <a:font script="Deva" typeface="Mangal"/>
+        <a:font script="Telu" typeface="Gautami"/>
+        <a:font script="Taml" typeface="Latha"/>
+        <a:font script="Syrc" typeface="Estrangelo Edessa"/>
+        <a:font script="Orya" typeface="Kalinga"/>
+        <a:font script="Mlym" typeface="Kartika"/>
+        <a:font script="Laoo" typeface="DokChampa"/>
+        <a:font script="Sinh" typeface="Iskoola Pota"/>
+        <a:font script="Mong" typeface="Mongolian Baiti"/>
+        <a:font script="Viet" typeface="Times New Roman"/>
+        <a:font script="Uigh" typeface="Microsoft Uighur"/>
+        <a:font script="Geor" typeface="Sylfaen"/>
+        <a:font script="Armn" typeface="Arial"/>
+        <a:font script="Bugi" typeface="Leelawadee UI"/>
+        <a:font script="Bopo" typeface="Microsoft JhengHei"/>
+        <a:font script="Java" typeface="Javanese Text"/>
+        <a:font script="Lisu" typeface="Segoe UI"/>
+        <a:font script="Mymr" typeface="Myanmar Text"/>
+        <a:font script="Nkoo" typeface="Ebrima"/>
+        <a:font script="Olck" typeface="Nirmala UI"/>
+        <a:font script="Osma" typeface="Ebrima"/>
+        <a:font script="Phag" typeface="Phagspa"/>
+        <a:font script="Syrn" typeface="Estrangelo Edessa"/>
+        <a:font script="Syrj" typeface="Estrangelo Edessa"/>
+        <a:font script="Syre" typeface="Estrangelo Edessa"/>
+        <a:font script="Sora" typeface="Nirmala UI"/>
+        <a:font script="Tale" typeface="Microsoft Tai Le"/>
+        <a:font script="Talu" typeface="Microsoft New Tai Lue"/>
+        <a:font script="Tfng" typeface="Ebrima"/>
+      </a:majorFont>
+      <a:minorFont>
+        <a:latin typeface="Calibri" panose="020F0502020204030204"/>
+        <a:ea typeface=""/>
+        <a:cs typeface=""/>
+        <a:font script="Jpan" typeface="游ゴシック"/>
+        <a:font script="Hang" typeface="맑은 고딕"/>
+        <a:font script="Hans" typeface="等线"/>
+        <a:font script="Hant" typeface="新細明體"/>
+        <a:font script="Arab" typeface="Arial"/>
+        <a:font script="Hebr" typeface="Arial"/>
+        <a:font script="Thai" typeface="Cordia New"/>
+        <a:font script="Ethi" typeface="Nyala"/>
+        <a:font script="Beng" typeface="Vrinda"/>
+        <a:font script="Gujr" typeface="Shruti"/>
+        <a:font script="Khmr" typeface="DaunPenh"/>
+        <a:font script="Knda" typeface="Tunga"/>
+        <a:font script="Guru" typeface="Raavi"/>
+        <a:font script="Cans" typeface="Euphemia"/>
+        <a:font script="Cher" typeface="Plantagenet Cherokee"/>
+        <a:font script="Yiii" typeface="Microsoft Yi Baiti"/>
+        <a:font script="Tibt" typeface="Microsoft Himalaya"/>
+        <a:font script="Thaa" typeface="MV Boli"/>
+        <a:font script="Deva" typeface="Mangal"/>
+        <a:font script="Telu" typeface="Gautami"/>
+        <a:font script="Taml" typeface="Latha"/>
+        <a:font script="Syrc" typeface="Estrangelo Edessa"/>
+        <a:font script="Orya" typeface="Kalinga"/>
+        <a:font script="Mlym" typeface="Kartika"/>
+        <a:font script="Laoo" typeface="DokChampa"/>
+        <a:font script="Sinh" typeface="Iskoola Pota"/>
+        <a:font script="Mong" typeface="Mongolian Baiti"/>
+        <a:font script="Viet" typeface="Arial"/>
+        <a:font script="Uigh" typeface="Microsoft Uighur"/>
+        <a:font script="Geor" typeface="Sylfaen"/>
+        <a:font script="Armn" typeface="Arial"/>
+        <a:font script="Bugi" typeface="Leelawadee UI"/>
+        <a:font script="Bopo" typeface="Microsoft JhengHei"/>
+        <a:font script="Java" typeface="Javanese Text"/>
+        <a:font script="Lisu" typeface="Segoe UI"/>
+        <a:font script="Mymr" typeface="Myanmar Text"/>
+        <a:font script="Nkoo" typeface="Ebrima"/>
+        <a:font script="Olck" typeface="Nirmala UI"/>
+        <a:font script="Osma" typeface="Ebrima"/>
+        <a:font script="Phag" typeface="Phagspa"/>
+        <a:font script="Syrn" typeface="Estrangelo Edessa"/>
+        <a:font script="Syrj" typeface="Estrangelo Edessa"/>
+        <a:font script="Syre" typeface="Estrangelo Edessa"/>
+        <a:font script="Sora" typeface="Nirmala UI"/>
+        <a:font script="Tale" typeface="Microsoft Tai Le"/>
+        <a:font script="Talu" typeface="Microsoft New Tai Lue"/>
+        <a:font script="Tfng" typeface="Ebrima"/>
+      </a:minorFont>
+    </a:fontScheme>
+    <a:fmtScheme name="Office">
+      <a:fillStyleLst>
+        <a:solidFill>
+          <a:schemeClr val="phClr"/>
+        </a:solidFill>
+        <a:gradFill rotWithShape="1">
+          <a:gsLst>
+            <a:gs pos="0">
+              <a:schemeClr val="phClr">
+                <a:lumMod val="110000"/>
+                <a:satMod val="105000"/>
+                <a:tint val="67000"/>
+              </a:schemeClr>
+            </a:gs>
+            <a:gs pos="50000">
+              <a:schemeClr val="phClr">
+                <a:lumMod val="105000"/>
+                <a:satMod val="103000"/>
+                <a:tint val="73000"/>
+              </a:schemeClr>
+            </a:gs>
+            <a:gs pos="100000">
+              <a:schemeClr val="phClr">
+                <a:lumMod val="105000"/>
+                <a:satMod val="109000"/>
+                <a:tint val="81000"/>
+              </a:schemeClr>
+            </a:gs>
+          </a:gsLst>
+          <a:lin ang="5400000" scaled="0"/>
+        </a:gradFill>
+        <a:gradFill rotWithShape="1">
+          <a:gsLst>
+            <a:gs pos="0">
+              <a:schemeClr val="phClr">
+                <a:satMod val="103000"/>
+                <a:lumMod val="102000"/>
+                <a:tint val="94000"/>
+              </a:schemeClr>
+            </a:gs>
+            <a:gs pos="50000">
+              <a:schemeClr val="phClr">
+                <a:satMod val="110000"/>
+                <a:lumMod val="100000"/>
+                <a:shade val="100000"/>
+              </a:schemeClr>
+            </a:gs>
+            <a:gs pos="100000">
+              <a:schemeClr val="phClr">
+                <a:lumMod val="99000"/>
+                <a:satMod val="120000"/>
+                <a:shade val="78000"/>
+              </a:schemeClr>
+            </a:gs>
+          </a:gsLst>
+          <a:lin ang="5400000" scaled="0"/>
+        </a:gradFill>
+      </a:fillStyleLst>
+      <a:lnStyleLst>
+        <a:ln w="6350" cap="flat" cmpd="sng" algn="ctr">
+          <a:solidFill>
+            <a:schemeClr val="phClr"/>
+          </a:solidFill>
+          <a:prstDash val="solid"/>
+          <a:miter lim="800000"/>
+        </a:ln>
+        <a:ln w="12700" cap="flat" cmpd="sng" algn="ctr">
+          <a:solidFill>
+            <a:schemeClr val="phClr"/>
+          </a:solidFill>
+          <a:prstDash val="solid"/>
+          <a:miter lim="800000"/>
+        </a:ln>
+        <a:ln w="19050" cap="flat" cmpd="sng" algn="ctr">
+          <a:solidFill>
+            <a:schemeClr val="phClr"/>
+          </a:solidFill>
+          <a:prstDash val="solid"/>
+          <a:miter lim="800000"/>
+        </a:ln>
+      </a:lnStyleLst>
+      <a:effectStyleLst>
+        <a:effectStyle>
+          <a:effectLst/>
+        </a:effectStyle>
+        <a:effectStyle>
+          <a:effectLst/>
+        </a:effectStyle>
+        <a:effectStyle>
+          <a:effectLst>
+            <a:outerShdw blurRad="57150" dist="19050" dir="5400000" algn="ctr" rotWithShape="0">
+              <a:srgbClr val="000000">
+                <a:alpha val="63000"/>
+              </a:srgbClr>
+            </a:outerShdw>
+          </a:effectLst>
+        </a:effectStyle>
+      </a:effectStyleLst>
+      <a:bgFillStyleLst>
+        <a:solidFill>
+          <a:schemeClr val="phClr"/>
+        </a:solidFill>
+        <a:solidFill>
+          <a:schemeClr val="phClr">
+            <a:tint val="95000"/>
+            <a:satMod val="170000"/>
+          </a:schemeClr>
+        </a:solidFill>
+        <a:gradFill rotWithShape="1">
+          <a:gsLst>
+            <a:gs pos="0">
+              <a:schemeClr val="phClr">
+                <a:tint val="93000"/>
+                <a:satMod val="150000"/>
+                <a:shade val="98000"/>
+                <a:lumMod val="102000"/>
+              </a:schemeClr>
+            </a:gs>
+            <a:gs pos="50000">
+              <a:schemeClr val="phClr">
+                <a:tint val="98000"/>
+                <a:satMod val="130000"/>
+                <a:shade val="90000"/>
+                <a:lumMod val="103000"/>
+              </a:schemeClr>
+            </a:gs>
+            <a:gs pos="100000">
+              <a:schemeClr val="phClr">
+                <a:shade val="63000"/>
+                <a:satMod val="120000"/>
+              </a:schemeClr>
+            </a:gs>
+          </a:gsLst>
+          <a:lin ang="5400000" scaled="0"/>
+        </a:gradFill>
+      </a:bgFillStyleLst>
+    </a:fmtScheme>
+  </a:themeElements>
   <a:objectDefaults/>
   <a:extraClrSchemeLst/>
   <a:extLst>

</xml_diff>